<commit_message>
Cleaned up data files Powerpoint presentation draft 2 Uploading first draft of report Revised sampling and plot-making code in R markdown doc
</commit_message>
<xml_diff>
--- a/homeless_presentation.pptx
+++ b/homeless_presentation.pptx
@@ -8,9 +8,9 @@
     <p:sldId id="256" r:id="rId2"/>
     <p:sldId id="257" r:id="rId3"/>
     <p:sldId id="260" r:id="rId4"/>
-    <p:sldId id="264" r:id="rId5"/>
+    <p:sldId id="258" r:id="rId5"/>
     <p:sldId id="267" r:id="rId6"/>
-    <p:sldId id="258" r:id="rId7"/>
+    <p:sldId id="264" r:id="rId7"/>
     <p:sldId id="259" r:id="rId8"/>
     <p:sldId id="265" r:id="rId9"/>
     <p:sldId id="261" r:id="rId10"/>
@@ -115,6 +115,11 @@
       </a:defRPr>
     </a:lvl9pPr>
   </p:defaultTextStyle>
+  <p:extLst>
+    <p:ext uri="{EFAFB233-063F-42B5-8137-9DF3F51BA10A}">
+      <p15:sldGuideLst xmlns:p15="http://schemas.microsoft.com/office/powerpoint/2012/main"/>
+    </p:ext>
+  </p:extLst>
 </p:presentation>
 </file>
 
@@ -314,7 +319,7 @@
           <a:p>
             <a:fld id="{F4247287-ABFE-4705-AAC5-D4BC376EC03D}" type="datetimeFigureOut">
               <a:rPr lang="en-US" smtClean="0"/>
-              <a:t>12/8/2021</a:t>
+              <a:t>12/9/2021</a:t>
             </a:fld>
             <a:endParaRPr lang="en-US"/>
           </a:p>
@@ -595,7 +600,7 @@
           <a:p>
             <a:fld id="{F4247287-ABFE-4705-AAC5-D4BC376EC03D}" type="datetimeFigureOut">
               <a:rPr lang="en-US" smtClean="0"/>
-              <a:t>12/8/2021</a:t>
+              <a:t>12/9/2021</a:t>
             </a:fld>
             <a:endParaRPr lang="en-US"/>
           </a:p>
@@ -787,7 +792,7 @@
           <a:p>
             <a:fld id="{F4247287-ABFE-4705-AAC5-D4BC376EC03D}" type="datetimeFigureOut">
               <a:rPr lang="en-US" smtClean="0"/>
-              <a:t>12/8/2021</a:t>
+              <a:t>12/9/2021</a:t>
             </a:fld>
             <a:endParaRPr lang="en-US"/>
           </a:p>
@@ -1048,7 +1053,7 @@
           <a:p>
             <a:fld id="{F4247287-ABFE-4705-AAC5-D4BC376EC03D}" type="datetimeFigureOut">
               <a:rPr lang="en-US" smtClean="0"/>
-              <a:t>12/8/2021</a:t>
+              <a:t>12/9/2021</a:t>
             </a:fld>
             <a:endParaRPr lang="en-US"/>
           </a:p>
@@ -1474,7 +1479,7 @@
           <a:p>
             <a:fld id="{F4247287-ABFE-4705-AAC5-D4BC376EC03D}" type="datetimeFigureOut">
               <a:rPr lang="en-US" smtClean="0"/>
-              <a:t>12/8/2021</a:t>
+              <a:t>12/9/2021</a:t>
             </a:fld>
             <a:endParaRPr lang="en-US"/>
           </a:p>
@@ -2020,7 +2025,7 @@
           <a:p>
             <a:fld id="{F4247287-ABFE-4705-AAC5-D4BC376EC03D}" type="datetimeFigureOut">
               <a:rPr lang="en-US" smtClean="0"/>
-              <a:t>12/8/2021</a:t>
+              <a:t>12/9/2021</a:t>
             </a:fld>
             <a:endParaRPr lang="en-US"/>
           </a:p>
@@ -2851,7 +2856,7 @@
           <a:p>
             <a:fld id="{F4247287-ABFE-4705-AAC5-D4BC376EC03D}" type="datetimeFigureOut">
               <a:rPr lang="en-US" smtClean="0"/>
-              <a:t>12/8/2021</a:t>
+              <a:t>12/9/2021</a:t>
             </a:fld>
             <a:endParaRPr lang="en-US"/>
           </a:p>
@@ -3021,7 +3026,7 @@
           <a:p>
             <a:fld id="{F4247287-ABFE-4705-AAC5-D4BC376EC03D}" type="datetimeFigureOut">
               <a:rPr lang="en-US" smtClean="0"/>
-              <a:t>12/8/2021</a:t>
+              <a:t>12/9/2021</a:t>
             </a:fld>
             <a:endParaRPr lang="en-US"/>
           </a:p>
@@ -3201,7 +3206,7 @@
           <a:p>
             <a:fld id="{F4247287-ABFE-4705-AAC5-D4BC376EC03D}" type="datetimeFigureOut">
               <a:rPr lang="en-US" smtClean="0"/>
-              <a:t>12/8/2021</a:t>
+              <a:t>12/9/2021</a:t>
             </a:fld>
             <a:endParaRPr lang="en-US"/>
           </a:p>
@@ -3371,7 +3376,7 @@
           <a:p>
             <a:fld id="{F4247287-ABFE-4705-AAC5-D4BC376EC03D}" type="datetimeFigureOut">
               <a:rPr lang="en-US" smtClean="0"/>
-              <a:t>12/8/2021</a:t>
+              <a:t>12/9/2021</a:t>
             </a:fld>
             <a:endParaRPr lang="en-US"/>
           </a:p>
@@ -3628,7 +3633,7 @@
           <a:p>
             <a:fld id="{F4247287-ABFE-4705-AAC5-D4BC376EC03D}" type="datetimeFigureOut">
               <a:rPr lang="en-US" smtClean="0"/>
-              <a:t>12/8/2021</a:t>
+              <a:t>12/9/2021</a:t>
             </a:fld>
             <a:endParaRPr lang="en-US"/>
           </a:p>
@@ -3860,7 +3865,7 @@
           <a:p>
             <a:fld id="{F4247287-ABFE-4705-AAC5-D4BC376EC03D}" type="datetimeFigureOut">
               <a:rPr lang="en-US" smtClean="0"/>
-              <a:t>12/8/2021</a:t>
+              <a:t>12/9/2021</a:t>
             </a:fld>
             <a:endParaRPr lang="en-US"/>
           </a:p>
@@ -4253,7 +4258,7 @@
           <a:p>
             <a:fld id="{F4247287-ABFE-4705-AAC5-D4BC376EC03D}" type="datetimeFigureOut">
               <a:rPr lang="en-US" smtClean="0"/>
-              <a:t>12/8/2021</a:t>
+              <a:t>12/9/2021</a:t>
             </a:fld>
             <a:endParaRPr lang="en-US"/>
           </a:p>
@@ -4371,7 +4376,7 @@
           <a:p>
             <a:fld id="{F4247287-ABFE-4705-AAC5-D4BC376EC03D}" type="datetimeFigureOut">
               <a:rPr lang="en-US" smtClean="0"/>
-              <a:t>12/8/2021</a:t>
+              <a:t>12/9/2021</a:t>
             </a:fld>
             <a:endParaRPr lang="en-US"/>
           </a:p>
@@ -4466,7 +4471,7 @@
           <a:p>
             <a:fld id="{F4247287-ABFE-4705-AAC5-D4BC376EC03D}" type="datetimeFigureOut">
               <a:rPr lang="en-US" smtClean="0"/>
-              <a:t>12/8/2021</a:t>
+              <a:t>12/9/2021</a:t>
             </a:fld>
             <a:endParaRPr lang="en-US"/>
           </a:p>
@@ -4739,7 +4744,7 @@
           <a:p>
             <a:fld id="{F4247287-ABFE-4705-AAC5-D4BC376EC03D}" type="datetimeFigureOut">
               <a:rPr lang="en-US" smtClean="0"/>
-              <a:t>12/8/2021</a:t>
+              <a:t>12/9/2021</a:t>
             </a:fld>
             <a:endParaRPr lang="en-US"/>
           </a:p>
@@ -5020,7 +5025,7 @@
           <a:p>
             <a:fld id="{F4247287-ABFE-4705-AAC5-D4BC376EC03D}" type="datetimeFigureOut">
               <a:rPr lang="en-US" smtClean="0"/>
-              <a:t>12/8/2021</a:t>
+              <a:t>12/9/2021</a:t>
             </a:fld>
             <a:endParaRPr lang="en-US"/>
           </a:p>
@@ -5260,7 +5265,7 @@
           <a:p>
             <a:fld id="{F4247287-ABFE-4705-AAC5-D4BC376EC03D}" type="datetimeFigureOut">
               <a:rPr lang="en-US" smtClean="0"/>
-              <a:t>12/8/2021</a:t>
+              <a:t>12/9/2021</a:t>
             </a:fld>
             <a:endParaRPr lang="en-US"/>
           </a:p>
@@ -6010,31 +6015,6 @@
           </a:p>
         </p:txBody>
       </p:sp>
-      <p:sp>
-        <p:nvSpPr>
-          <p:cNvPr id="3" name="Content Placeholder 2">
-            <a:extLst>
-              <a:ext uri="{FF2B5EF4-FFF2-40B4-BE49-F238E27FC236}">
-                <a16:creationId xmlns:a16="http://schemas.microsoft.com/office/drawing/2014/main" id="{FE5A7C58-9405-4576-A964-F931A4FDAF4E}"/>
-              </a:ext>
-            </a:extLst>
-          </p:cNvPr>
-          <p:cNvSpPr>
-            <a:spLocks noGrp="1"/>
-          </p:cNvSpPr>
-          <p:nvPr>
-            <p:ph idx="1"/>
-          </p:nvPr>
-        </p:nvSpPr>
-        <p:spPr/>
-        <p:txBody>
-          <a:bodyPr/>
-          <a:lstStyle/>
-          <a:p>
-            <a:endParaRPr lang="en-US" dirty="0"/>
-          </a:p>
-        </p:txBody>
-      </p:sp>
       <p:pic>
         <p:nvPicPr>
           <p:cNvPr id="5" name="Picture 4">
@@ -6057,7 +6037,7 @@
         </p:blipFill>
         <p:spPr>
           <a:xfrm>
-            <a:off x="411730" y="3334998"/>
+            <a:off x="759599" y="2440477"/>
             <a:ext cx="5156835" cy="2841965"/>
           </a:xfrm>
           <a:prstGeom prst="rect">
@@ -6087,7 +6067,7 @@
         </p:blipFill>
         <p:spPr>
           <a:xfrm>
-            <a:off x="6750518" y="3334998"/>
+            <a:off x="6641187" y="2440477"/>
             <a:ext cx="4603282" cy="2841965"/>
           </a:xfrm>
           <a:prstGeom prst="rect">
@@ -6095,6 +6075,76 @@
           </a:prstGeom>
         </p:spPr>
       </p:pic>
+      <p:sp>
+        <p:nvSpPr>
+          <p:cNvPr id="4" name="TextBox 3">
+            <a:extLst>
+              <a:ext uri="{FF2B5EF4-FFF2-40B4-BE49-F238E27FC236}">
+                <a16:creationId xmlns:a16="http://schemas.microsoft.com/office/drawing/2014/main" id="{B0307FBE-2FD4-46FD-B4A5-471BC9228CAA}"/>
+              </a:ext>
+            </a:extLst>
+          </p:cNvPr>
+          <p:cNvSpPr txBox="1"/>
+          <p:nvPr/>
+        </p:nvSpPr>
+        <p:spPr>
+          <a:xfrm>
+            <a:off x="759598" y="1908315"/>
+            <a:ext cx="4448505" cy="523220"/>
+          </a:xfrm>
+          <a:prstGeom prst="rect">
+            <a:avLst/>
+          </a:prstGeom>
+          <a:noFill/>
+        </p:spPr>
+        <p:txBody>
+          <a:bodyPr wrap="square" rtlCol="0">
+            <a:spAutoFit/>
+          </a:bodyPr>
+          <a:lstStyle/>
+          <a:p>
+            <a:r>
+              <a:rPr lang="en-US" sz="2800" dirty="0"/>
+              <a:t>Warmup Draws = 0</a:t>
+            </a:r>
+          </a:p>
+        </p:txBody>
+      </p:sp>
+      <p:sp>
+        <p:nvSpPr>
+          <p:cNvPr id="8" name="TextBox 7">
+            <a:extLst>
+              <a:ext uri="{FF2B5EF4-FFF2-40B4-BE49-F238E27FC236}">
+                <a16:creationId xmlns:a16="http://schemas.microsoft.com/office/drawing/2014/main" id="{469210CA-5B46-4E21-9B00-F4FEE298BD1C}"/>
+              </a:ext>
+            </a:extLst>
+          </p:cNvPr>
+          <p:cNvSpPr txBox="1"/>
+          <p:nvPr/>
+        </p:nvSpPr>
+        <p:spPr>
+          <a:xfrm>
+            <a:off x="6641187" y="1917257"/>
+            <a:ext cx="4448505" cy="523220"/>
+          </a:xfrm>
+          <a:prstGeom prst="rect">
+            <a:avLst/>
+          </a:prstGeom>
+          <a:noFill/>
+        </p:spPr>
+        <p:txBody>
+          <a:bodyPr wrap="square" rtlCol="0">
+            <a:spAutoFit/>
+          </a:bodyPr>
+          <a:lstStyle/>
+          <a:p>
+            <a:r>
+              <a:rPr lang="en-US" sz="2800" dirty="0"/>
+              <a:t>Warmup Draws = 1000</a:t>
+            </a:r>
+          </a:p>
+        </p:txBody>
+      </p:sp>
     </p:spTree>
     <p:extLst>
       <p:ext uri="{BB962C8B-B14F-4D97-AF65-F5344CB8AC3E}">
@@ -6183,8 +6233,8 @@
         </p:blipFill>
         <p:spPr>
           <a:xfrm>
-            <a:off x="977074" y="1931859"/>
-            <a:ext cx="6400813" cy="3657607"/>
+            <a:off x="1778967" y="1559124"/>
+            <a:ext cx="8634065" cy="4933751"/>
           </a:xfrm>
         </p:spPr>
       </p:pic>
@@ -6291,6 +6341,12 @@
             <a:r>
               <a:rPr lang="en-US" dirty="0"/>
               <a:t>Adjust district coefficient uncertainty by district sample size</a:t>
+            </a:r>
+          </a:p>
+          <a:p>
+            <a:r>
+              <a:rPr lang="en-US" dirty="0"/>
+              <a:t>Consider modeling data previously filtered out</a:t>
             </a:r>
           </a:p>
           <a:p>
@@ -6685,7 +6741,7 @@
           <a:p>
             <a:pPr algn="r"/>
             <a:r>
-              <a:rPr lang="en-US" sz="9600" spc="-300">
+              <a:rPr lang="en-US" sz="9600" spc="-300" dirty="0">
                 <a:gradFill flip="none" rotWithShape="1">
                   <a:gsLst>
                     <a:gs pos="32000">
@@ -6754,6 +6810,136 @@
           </a:prstGeom>
         </p:spPr>
       </p:pic>
+      <p:pic>
+        <p:nvPicPr>
+          <p:cNvPr id="4" name="Picture 3">
+            <a:extLst>
+              <a:ext uri="{FF2B5EF4-FFF2-40B4-BE49-F238E27FC236}">
+                <a16:creationId xmlns:a16="http://schemas.microsoft.com/office/drawing/2014/main" id="{F764AEC5-4E52-4A04-9528-5904D0741512}"/>
+              </a:ext>
+            </a:extLst>
+          </p:cNvPr>
+          <p:cNvPicPr>
+            <a:picLocks noChangeAspect="1"/>
+          </p:cNvPicPr>
+          <p:nvPr/>
+        </p:nvPicPr>
+        <p:blipFill>
+          <a:blip r:embed="rId4"/>
+          <a:stretch>
+            <a:fillRect/>
+          </a:stretch>
+        </p:blipFill>
+        <p:spPr>
+          <a:xfrm>
+            <a:off x="3810000" y="3996040"/>
+            <a:ext cx="2611120" cy="2457340"/>
+          </a:xfrm>
+          <a:prstGeom prst="rect">
+            <a:avLst/>
+          </a:prstGeom>
+        </p:spPr>
+      </p:pic>
+      <p:pic>
+        <p:nvPicPr>
+          <p:cNvPr id="7" name="Picture 6">
+            <a:extLst>
+              <a:ext uri="{FF2B5EF4-FFF2-40B4-BE49-F238E27FC236}">
+                <a16:creationId xmlns:a16="http://schemas.microsoft.com/office/drawing/2014/main" id="{79233F77-C8DB-4747-97BC-898B89653015}"/>
+              </a:ext>
+            </a:extLst>
+          </p:cNvPr>
+          <p:cNvPicPr>
+            <a:picLocks noChangeAspect="1"/>
+          </p:cNvPicPr>
+          <p:nvPr/>
+        </p:nvPicPr>
+        <p:blipFill>
+          <a:blip r:embed="rId5"/>
+          <a:stretch>
+            <a:fillRect/>
+          </a:stretch>
+        </p:blipFill>
+        <p:spPr>
+          <a:xfrm>
+            <a:off x="648266" y="4436420"/>
+            <a:ext cx="2686188" cy="1358970"/>
+          </a:xfrm>
+          <a:prstGeom prst="rect">
+            <a:avLst/>
+          </a:prstGeom>
+        </p:spPr>
+      </p:pic>
+      <p:sp>
+        <p:nvSpPr>
+          <p:cNvPr id="8" name="TextBox 7">
+            <a:extLst>
+              <a:ext uri="{FF2B5EF4-FFF2-40B4-BE49-F238E27FC236}">
+                <a16:creationId xmlns:a16="http://schemas.microsoft.com/office/drawing/2014/main" id="{497C8D35-A8B6-48EA-8F22-780F2F85EC3F}"/>
+              </a:ext>
+            </a:extLst>
+          </p:cNvPr>
+          <p:cNvSpPr txBox="1"/>
+          <p:nvPr/>
+        </p:nvSpPr>
+        <p:spPr>
+          <a:xfrm>
+            <a:off x="3734932" y="3547960"/>
+            <a:ext cx="2686188" cy="369332"/>
+          </a:xfrm>
+          <a:prstGeom prst="rect">
+            <a:avLst/>
+          </a:prstGeom>
+          <a:noFill/>
+        </p:spPr>
+        <p:txBody>
+          <a:bodyPr wrap="square" rtlCol="0">
+            <a:spAutoFit/>
+          </a:bodyPr>
+          <a:lstStyle/>
+          <a:p>
+            <a:r>
+              <a:rPr lang="en-US" dirty="0"/>
+              <a:t>2010 Census Tracts</a:t>
+            </a:r>
+          </a:p>
+        </p:txBody>
+      </p:sp>
+      <p:sp>
+        <p:nvSpPr>
+          <p:cNvPr id="9" name="TextBox 8">
+            <a:extLst>
+              <a:ext uri="{FF2B5EF4-FFF2-40B4-BE49-F238E27FC236}">
+                <a16:creationId xmlns:a16="http://schemas.microsoft.com/office/drawing/2014/main" id="{3C777A76-E3F8-421C-A878-5D01AC73C5B6}"/>
+              </a:ext>
+            </a:extLst>
+          </p:cNvPr>
+          <p:cNvSpPr txBox="1"/>
+          <p:nvPr/>
+        </p:nvSpPr>
+        <p:spPr>
+          <a:xfrm>
+            <a:off x="575172" y="4045800"/>
+            <a:ext cx="2686188" cy="369332"/>
+          </a:xfrm>
+          <a:prstGeom prst="rect">
+            <a:avLst/>
+          </a:prstGeom>
+          <a:noFill/>
+        </p:spPr>
+        <p:txBody>
+          <a:bodyPr wrap="square" rtlCol="0">
+            <a:spAutoFit/>
+          </a:bodyPr>
+          <a:lstStyle/>
+          <a:p>
+            <a:r>
+              <a:rPr lang="en-US" dirty="0"/>
+              <a:t>SLC Council Districts</a:t>
+            </a:r>
+          </a:p>
+        </p:txBody>
+      </p:sp>
     </p:spTree>
     <p:extLst>
       <p:ext uri="{BB962C8B-B14F-4D97-AF65-F5344CB8AC3E}">
@@ -6768,6 +6954,223 @@
 </file>
 
 <file path=ppt/slides/slide4.xml><?xml version="1.0" encoding="utf-8"?>
+<p:sld xmlns:a="http://schemas.openxmlformats.org/drawingml/2006/main" xmlns:r="http://schemas.openxmlformats.org/officeDocument/2006/relationships" xmlns:p="http://schemas.openxmlformats.org/presentationml/2006/main">
+  <p:cSld>
+    <p:spTree>
+      <p:nvGrpSpPr>
+        <p:cNvPr id="1" name=""/>
+        <p:cNvGrpSpPr/>
+        <p:nvPr/>
+      </p:nvGrpSpPr>
+      <p:grpSpPr>
+        <a:xfrm>
+          <a:off x="0" y="0"/>
+          <a:ext cx="0" cy="0"/>
+          <a:chOff x="0" y="0"/>
+          <a:chExt cx="0" cy="0"/>
+        </a:xfrm>
+      </p:grpSpPr>
+      <p:sp>
+        <p:nvSpPr>
+          <p:cNvPr id="2" name="Title 1">
+            <a:extLst>
+              <a:ext uri="{FF2B5EF4-FFF2-40B4-BE49-F238E27FC236}">
+                <a16:creationId xmlns:a16="http://schemas.microsoft.com/office/drawing/2014/main" id="{1F3EC411-7274-4A70-89F8-1CADE6ABA767}"/>
+              </a:ext>
+            </a:extLst>
+          </p:cNvPr>
+          <p:cNvSpPr>
+            <a:spLocks noGrp="1"/>
+          </p:cNvSpPr>
+          <p:nvPr>
+            <p:ph type="title"/>
+          </p:nvPr>
+        </p:nvSpPr>
+        <p:spPr/>
+        <p:txBody>
+          <a:bodyPr/>
+          <a:lstStyle/>
+          <a:p>
+            <a:r>
+              <a:rPr lang="en-US" dirty="0"/>
+              <a:t>Research Question</a:t>
+            </a:r>
+          </a:p>
+        </p:txBody>
+      </p:sp>
+      <p:sp>
+        <p:nvSpPr>
+          <p:cNvPr id="3" name="Content Placeholder 2">
+            <a:extLst>
+              <a:ext uri="{FF2B5EF4-FFF2-40B4-BE49-F238E27FC236}">
+                <a16:creationId xmlns:a16="http://schemas.microsoft.com/office/drawing/2014/main" id="{FE5A7C58-9405-4576-A964-F931A4FDAF4E}"/>
+              </a:ext>
+            </a:extLst>
+          </p:cNvPr>
+          <p:cNvSpPr>
+            <a:spLocks noGrp="1"/>
+          </p:cNvSpPr>
+          <p:nvPr>
+            <p:ph idx="1"/>
+          </p:nvPr>
+        </p:nvSpPr>
+        <p:spPr/>
+        <p:txBody>
+          <a:bodyPr>
+            <a:normAutofit/>
+          </a:bodyPr>
+          <a:lstStyle/>
+          <a:p>
+            <a:r>
+              <a:rPr lang="en-US" sz="4000" dirty="0"/>
+              <a:t>Primary: Is there a difference in response time among city districts?</a:t>
+            </a:r>
+          </a:p>
+          <a:p>
+            <a:r>
+              <a:rPr lang="en-US" sz="4000" dirty="0"/>
+              <a:t>Secondary: How does the presence of COVID-19 affect response time?</a:t>
+            </a:r>
+          </a:p>
+        </p:txBody>
+      </p:sp>
+    </p:spTree>
+    <p:extLst>
+      <p:ext uri="{BB962C8B-B14F-4D97-AF65-F5344CB8AC3E}">
+        <p14:creationId xmlns:p14="http://schemas.microsoft.com/office/powerpoint/2010/main" val="127370635"/>
+      </p:ext>
+    </p:extLst>
+  </p:cSld>
+  <p:clrMapOvr>
+    <a:masterClrMapping/>
+  </p:clrMapOvr>
+</p:sld>
+</file>
+
+<file path=ppt/slides/slide5.xml><?xml version="1.0" encoding="utf-8"?>
+<p:sld xmlns:a="http://schemas.openxmlformats.org/drawingml/2006/main" xmlns:r="http://schemas.openxmlformats.org/officeDocument/2006/relationships" xmlns:p="http://schemas.openxmlformats.org/presentationml/2006/main">
+  <p:cSld>
+    <p:spTree>
+      <p:nvGrpSpPr>
+        <p:cNvPr id="1" name=""/>
+        <p:cNvGrpSpPr/>
+        <p:nvPr/>
+      </p:nvGrpSpPr>
+      <p:grpSpPr>
+        <a:xfrm>
+          <a:off x="0" y="0"/>
+          <a:ext cx="0" cy="0"/>
+          <a:chOff x="0" y="0"/>
+          <a:chExt cx="0" cy="0"/>
+        </a:xfrm>
+      </p:grpSpPr>
+      <p:sp>
+        <p:nvSpPr>
+          <p:cNvPr id="2" name="Title 1">
+            <a:extLst>
+              <a:ext uri="{FF2B5EF4-FFF2-40B4-BE49-F238E27FC236}">
+                <a16:creationId xmlns:a16="http://schemas.microsoft.com/office/drawing/2014/main" id="{1F3EC411-7274-4A70-89F8-1CADE6ABA767}"/>
+              </a:ext>
+            </a:extLst>
+          </p:cNvPr>
+          <p:cNvSpPr>
+            <a:spLocks noGrp="1"/>
+          </p:cNvSpPr>
+          <p:nvPr>
+            <p:ph type="title"/>
+          </p:nvPr>
+        </p:nvSpPr>
+        <p:spPr/>
+        <p:txBody>
+          <a:bodyPr/>
+          <a:lstStyle/>
+          <a:p>
+            <a:r>
+              <a:rPr lang="en-US" dirty="0"/>
+              <a:t>EDA</a:t>
+            </a:r>
+          </a:p>
+        </p:txBody>
+      </p:sp>
+      <p:pic>
+        <p:nvPicPr>
+          <p:cNvPr id="9" name="Content Placeholder 8" descr="Chart, box and whisker chart&#10;&#10;Description automatically generated">
+            <a:extLst>
+              <a:ext uri="{FF2B5EF4-FFF2-40B4-BE49-F238E27FC236}">
+                <a16:creationId xmlns:a16="http://schemas.microsoft.com/office/drawing/2014/main" id="{F38884BC-291A-4FF2-93BC-B6A222EC906B}"/>
+              </a:ext>
+            </a:extLst>
+          </p:cNvPr>
+          <p:cNvPicPr>
+            <a:picLocks noGrp="1" noChangeAspect="1"/>
+          </p:cNvPicPr>
+          <p:nvPr>
+            <p:ph idx="1"/>
+          </p:nvPr>
+        </p:nvPicPr>
+        <p:blipFill>
+          <a:blip r:embed="rId2">
+            <a:extLst>
+              <a:ext uri="{28A0092B-C50C-407E-A947-70E740481C1C}">
+                <a14:useLocalDpi xmlns:a14="http://schemas.microsoft.com/office/drawing/2010/main" val="0"/>
+              </a:ext>
+            </a:extLst>
+          </a:blip>
+          <a:stretch>
+            <a:fillRect/>
+          </a:stretch>
+        </p:blipFill>
+        <p:spPr>
+          <a:xfrm>
+            <a:off x="4952987" y="1600195"/>
+            <a:ext cx="6400813" cy="3657607"/>
+          </a:xfrm>
+        </p:spPr>
+      </p:pic>
+      <p:pic>
+        <p:nvPicPr>
+          <p:cNvPr id="7" name="Picture 6">
+            <a:extLst>
+              <a:ext uri="{FF2B5EF4-FFF2-40B4-BE49-F238E27FC236}">
+                <a16:creationId xmlns:a16="http://schemas.microsoft.com/office/drawing/2014/main" id="{E8BFC903-361E-4895-BF4B-095D61A3C3BC}"/>
+              </a:ext>
+            </a:extLst>
+          </p:cNvPr>
+          <p:cNvPicPr>
+            <a:picLocks noChangeAspect="1"/>
+          </p:cNvPicPr>
+          <p:nvPr/>
+        </p:nvPicPr>
+        <p:blipFill>
+          <a:blip r:embed="rId3"/>
+          <a:stretch>
+            <a:fillRect/>
+          </a:stretch>
+        </p:blipFill>
+        <p:spPr>
+          <a:xfrm>
+            <a:off x="582978" y="1702103"/>
+            <a:ext cx="3738445" cy="3453792"/>
+          </a:xfrm>
+          <a:prstGeom prst="rect">
+            <a:avLst/>
+          </a:prstGeom>
+        </p:spPr>
+      </p:pic>
+    </p:spTree>
+    <p:extLst>
+      <p:ext uri="{BB962C8B-B14F-4D97-AF65-F5344CB8AC3E}">
+        <p14:creationId xmlns:p14="http://schemas.microsoft.com/office/powerpoint/2010/main" val="998861492"/>
+      </p:ext>
+    </p:extLst>
+  </p:cSld>
+  <p:clrMapOvr>
+    <a:masterClrMapping/>
+  </p:clrMapOvr>
+</p:sld>
+</file>
+
+<file path=ppt/slides/slide6.xml><?xml version="1.0" encoding="utf-8"?>
 <p:sld xmlns:a="http://schemas.openxmlformats.org/drawingml/2006/main" xmlns:r="http://schemas.openxmlformats.org/officeDocument/2006/relationships" xmlns:p="http://schemas.openxmlformats.org/presentationml/2006/main">
   <p:cSld>
     <p:spTree>
@@ -6897,223 +7300,6 @@
 </p:sld>
 </file>
 
-<file path=ppt/slides/slide5.xml><?xml version="1.0" encoding="utf-8"?>
-<p:sld xmlns:a="http://schemas.openxmlformats.org/drawingml/2006/main" xmlns:r="http://schemas.openxmlformats.org/officeDocument/2006/relationships" xmlns:p="http://schemas.openxmlformats.org/presentationml/2006/main">
-  <p:cSld>
-    <p:spTree>
-      <p:nvGrpSpPr>
-        <p:cNvPr id="1" name=""/>
-        <p:cNvGrpSpPr/>
-        <p:nvPr/>
-      </p:nvGrpSpPr>
-      <p:grpSpPr>
-        <a:xfrm>
-          <a:off x="0" y="0"/>
-          <a:ext cx="0" cy="0"/>
-          <a:chOff x="0" y="0"/>
-          <a:chExt cx="0" cy="0"/>
-        </a:xfrm>
-      </p:grpSpPr>
-      <p:sp>
-        <p:nvSpPr>
-          <p:cNvPr id="2" name="Title 1">
-            <a:extLst>
-              <a:ext uri="{FF2B5EF4-FFF2-40B4-BE49-F238E27FC236}">
-                <a16:creationId xmlns:a16="http://schemas.microsoft.com/office/drawing/2014/main" id="{1F3EC411-7274-4A70-89F8-1CADE6ABA767}"/>
-              </a:ext>
-            </a:extLst>
-          </p:cNvPr>
-          <p:cNvSpPr>
-            <a:spLocks noGrp="1"/>
-          </p:cNvSpPr>
-          <p:nvPr>
-            <p:ph type="title"/>
-          </p:nvPr>
-        </p:nvSpPr>
-        <p:spPr/>
-        <p:txBody>
-          <a:bodyPr/>
-          <a:lstStyle/>
-          <a:p>
-            <a:r>
-              <a:rPr lang="en-US" dirty="0"/>
-              <a:t>EDA</a:t>
-            </a:r>
-          </a:p>
-        </p:txBody>
-      </p:sp>
-      <p:pic>
-        <p:nvPicPr>
-          <p:cNvPr id="9" name="Content Placeholder 8" descr="Chart, box and whisker chart&#10;&#10;Description automatically generated">
-            <a:extLst>
-              <a:ext uri="{FF2B5EF4-FFF2-40B4-BE49-F238E27FC236}">
-                <a16:creationId xmlns:a16="http://schemas.microsoft.com/office/drawing/2014/main" id="{F38884BC-291A-4FF2-93BC-B6A222EC906B}"/>
-              </a:ext>
-            </a:extLst>
-          </p:cNvPr>
-          <p:cNvPicPr>
-            <a:picLocks noGrp="1" noChangeAspect="1"/>
-          </p:cNvPicPr>
-          <p:nvPr>
-            <p:ph idx="1"/>
-          </p:nvPr>
-        </p:nvPicPr>
-        <p:blipFill>
-          <a:blip r:embed="rId2">
-            <a:extLst>
-              <a:ext uri="{28A0092B-C50C-407E-A947-70E740481C1C}">
-                <a14:useLocalDpi xmlns:a14="http://schemas.microsoft.com/office/drawing/2010/main" val="0"/>
-              </a:ext>
-            </a:extLst>
-          </a:blip>
-          <a:stretch>
-            <a:fillRect/>
-          </a:stretch>
-        </p:blipFill>
-        <p:spPr>
-          <a:xfrm>
-            <a:off x="4952987" y="1600195"/>
-            <a:ext cx="6400813" cy="3657607"/>
-          </a:xfrm>
-        </p:spPr>
-      </p:pic>
-      <p:pic>
-        <p:nvPicPr>
-          <p:cNvPr id="7" name="Picture 6">
-            <a:extLst>
-              <a:ext uri="{FF2B5EF4-FFF2-40B4-BE49-F238E27FC236}">
-                <a16:creationId xmlns:a16="http://schemas.microsoft.com/office/drawing/2014/main" id="{E8BFC903-361E-4895-BF4B-095D61A3C3BC}"/>
-              </a:ext>
-            </a:extLst>
-          </p:cNvPr>
-          <p:cNvPicPr>
-            <a:picLocks noChangeAspect="1"/>
-          </p:cNvPicPr>
-          <p:nvPr/>
-        </p:nvPicPr>
-        <p:blipFill>
-          <a:blip r:embed="rId3"/>
-          <a:stretch>
-            <a:fillRect/>
-          </a:stretch>
-        </p:blipFill>
-        <p:spPr>
-          <a:xfrm>
-            <a:off x="582978" y="1702103"/>
-            <a:ext cx="3738445" cy="3453792"/>
-          </a:xfrm>
-          <a:prstGeom prst="rect">
-            <a:avLst/>
-          </a:prstGeom>
-        </p:spPr>
-      </p:pic>
-    </p:spTree>
-    <p:extLst>
-      <p:ext uri="{BB962C8B-B14F-4D97-AF65-F5344CB8AC3E}">
-        <p14:creationId xmlns:p14="http://schemas.microsoft.com/office/powerpoint/2010/main" val="998861492"/>
-      </p:ext>
-    </p:extLst>
-  </p:cSld>
-  <p:clrMapOvr>
-    <a:masterClrMapping/>
-  </p:clrMapOvr>
-</p:sld>
-</file>
-
-<file path=ppt/slides/slide6.xml><?xml version="1.0" encoding="utf-8"?>
-<p:sld xmlns:a="http://schemas.openxmlformats.org/drawingml/2006/main" xmlns:r="http://schemas.openxmlformats.org/officeDocument/2006/relationships" xmlns:p="http://schemas.openxmlformats.org/presentationml/2006/main">
-  <p:cSld>
-    <p:spTree>
-      <p:nvGrpSpPr>
-        <p:cNvPr id="1" name=""/>
-        <p:cNvGrpSpPr/>
-        <p:nvPr/>
-      </p:nvGrpSpPr>
-      <p:grpSpPr>
-        <a:xfrm>
-          <a:off x="0" y="0"/>
-          <a:ext cx="0" cy="0"/>
-          <a:chOff x="0" y="0"/>
-          <a:chExt cx="0" cy="0"/>
-        </a:xfrm>
-      </p:grpSpPr>
-      <p:sp>
-        <p:nvSpPr>
-          <p:cNvPr id="2" name="Title 1">
-            <a:extLst>
-              <a:ext uri="{FF2B5EF4-FFF2-40B4-BE49-F238E27FC236}">
-                <a16:creationId xmlns:a16="http://schemas.microsoft.com/office/drawing/2014/main" id="{1F3EC411-7274-4A70-89F8-1CADE6ABA767}"/>
-              </a:ext>
-            </a:extLst>
-          </p:cNvPr>
-          <p:cNvSpPr>
-            <a:spLocks noGrp="1"/>
-          </p:cNvSpPr>
-          <p:nvPr>
-            <p:ph type="title"/>
-          </p:nvPr>
-        </p:nvSpPr>
-        <p:spPr/>
-        <p:txBody>
-          <a:bodyPr/>
-          <a:lstStyle/>
-          <a:p>
-            <a:r>
-              <a:rPr lang="en-US" dirty="0"/>
-              <a:t>Research Question</a:t>
-            </a:r>
-          </a:p>
-        </p:txBody>
-      </p:sp>
-      <p:sp>
-        <p:nvSpPr>
-          <p:cNvPr id="3" name="Content Placeholder 2">
-            <a:extLst>
-              <a:ext uri="{FF2B5EF4-FFF2-40B4-BE49-F238E27FC236}">
-                <a16:creationId xmlns:a16="http://schemas.microsoft.com/office/drawing/2014/main" id="{FE5A7C58-9405-4576-A964-F931A4FDAF4E}"/>
-              </a:ext>
-            </a:extLst>
-          </p:cNvPr>
-          <p:cNvSpPr>
-            <a:spLocks noGrp="1"/>
-          </p:cNvSpPr>
-          <p:nvPr>
-            <p:ph idx="1"/>
-          </p:nvPr>
-        </p:nvSpPr>
-        <p:spPr/>
-        <p:txBody>
-          <a:bodyPr>
-            <a:normAutofit/>
-          </a:bodyPr>
-          <a:lstStyle/>
-          <a:p>
-            <a:r>
-              <a:rPr lang="en-US" sz="4000" dirty="0"/>
-              <a:t>Primary: Is there a difference in response time among city districts?</a:t>
-            </a:r>
-          </a:p>
-          <a:p>
-            <a:r>
-              <a:rPr lang="en-US" sz="4000" dirty="0"/>
-              <a:t>Secondary: How does the presence of COVID-19 affect response time?</a:t>
-            </a:r>
-          </a:p>
-        </p:txBody>
-      </p:sp>
-    </p:spTree>
-    <p:extLst>
-      <p:ext uri="{BB962C8B-B14F-4D97-AF65-F5344CB8AC3E}">
-        <p14:creationId xmlns:p14="http://schemas.microsoft.com/office/powerpoint/2010/main" val="127370635"/>
-      </p:ext>
-    </p:extLst>
-  </p:cSld>
-  <p:clrMapOvr>
-    <a:masterClrMapping/>
-  </p:clrMapOvr>
-</p:sld>
-</file>
-
 <file path=ppt/slides/slide7.xml><?xml version="1.0" encoding="utf-8"?>
 <p:sld xmlns:a="http://schemas.openxmlformats.org/drawingml/2006/main" xmlns:r="http://schemas.openxmlformats.org/officeDocument/2006/relationships" xmlns:p="http://schemas.openxmlformats.org/presentationml/2006/main">
   <p:cSld>
@@ -7159,8 +7345,8 @@
           </a:p>
         </p:txBody>
       </p:sp>
-      <mc:AlternateContent xmlns:mc="http://schemas.openxmlformats.org/markup-compatibility/2006">
-        <mc:Choice xmlns:a14="http://schemas.microsoft.com/office/drawing/2010/main" Requires="a14">
+      <mc:AlternateContent xmlns:mc="http://schemas.openxmlformats.org/markup-compatibility/2006" xmlns:a14="http://schemas.microsoft.com/office/drawing/2010/main">
+        <mc:Choice Requires="a14">
           <p:sp>
             <p:nvSpPr>
               <p:cNvPr id="3" name="Content Placeholder 2">
@@ -7731,7 +7917,7 @@
             </p:txBody>
           </p:sp>
         </mc:Choice>
-        <mc:Fallback>
+        <mc:Fallback xmlns="">
           <p:sp>
             <p:nvSpPr>
               <p:cNvPr id="3" name="Content Placeholder 2">
@@ -7829,8 +8015,8 @@
           </a:p>
         </p:txBody>
       </p:sp>
-      <mc:AlternateContent xmlns:mc="http://schemas.openxmlformats.org/markup-compatibility/2006">
-        <mc:Choice xmlns:a14="http://schemas.microsoft.com/office/drawing/2010/main" Requires="a14">
+      <mc:AlternateContent xmlns:mc="http://schemas.openxmlformats.org/markup-compatibility/2006" xmlns:a14="http://schemas.microsoft.com/office/drawing/2010/main">
+        <mc:Choice Requires="a14">
           <p:sp>
             <p:nvSpPr>
               <p:cNvPr id="3" name="Content Placeholder 2">
@@ -7918,13 +8104,20 @@
                 <a:pPr lvl="1"/>
                 <a:r>
                   <a:rPr lang="en-US" dirty="0"/>
-                  <a:t>Slice Sampling</a:t>
+                  <a:t>Univariate slice sampling</a:t>
+                </a:r>
+              </a:p>
+              <a:p>
+                <a:pPr lvl="1"/>
+                <a:r>
+                  <a:rPr lang="en-US" dirty="0"/>
+                  <a:t>Initial betas are MLE from GLM</a:t>
                 </a:r>
               </a:p>
             </p:txBody>
           </p:sp>
         </mc:Choice>
-        <mc:Fallback>
+        <mc:Fallback xmlns="">
           <p:sp>
             <p:nvSpPr>
               <p:cNvPr id="3" name="Content Placeholder 2">
@@ -8022,31 +8215,3288 @@
           </a:p>
         </p:txBody>
       </p:sp>
-      <p:sp>
-        <p:nvSpPr>
-          <p:cNvPr id="3" name="Content Placeholder 2">
-            <a:extLst>
-              <a:ext uri="{FF2B5EF4-FFF2-40B4-BE49-F238E27FC236}">
-                <a16:creationId xmlns:a16="http://schemas.microsoft.com/office/drawing/2014/main" id="{FE5A7C58-9405-4576-A964-F931A4FDAF4E}"/>
-              </a:ext>
-            </a:extLst>
-          </p:cNvPr>
-          <p:cNvSpPr>
-            <a:spLocks noGrp="1"/>
-          </p:cNvSpPr>
-          <p:nvPr>
-            <p:ph idx="1"/>
-          </p:nvPr>
-        </p:nvSpPr>
-        <p:spPr/>
-        <p:txBody>
-          <a:bodyPr/>
-          <a:lstStyle/>
-          <a:p>
-            <a:endParaRPr lang="en-US" dirty="0"/>
-          </a:p>
-        </p:txBody>
-      </p:sp>
+      <mc:AlternateContent xmlns:mc="http://schemas.openxmlformats.org/markup-compatibility/2006" xmlns:a14="http://schemas.microsoft.com/office/drawing/2010/main">
+        <mc:Choice Requires="a14">
+          <p:graphicFrame>
+            <p:nvGraphicFramePr>
+              <p:cNvPr id="4" name="Table 4">
+                <a:extLst>
+                  <a:ext uri="{FF2B5EF4-FFF2-40B4-BE49-F238E27FC236}">
+                    <a16:creationId xmlns:a16="http://schemas.microsoft.com/office/drawing/2014/main" id="{6F6E2AE0-5CC4-4129-BD47-3C98D4DBC6AC}"/>
+                  </a:ext>
+                </a:extLst>
+              </p:cNvPr>
+              <p:cNvGraphicFramePr>
+                <a:graphicFrameLocks noGrp="1"/>
+              </p:cNvGraphicFramePr>
+              <p:nvPr>
+                <p:ph idx="1"/>
+                <p:extLst>
+                  <p:ext uri="{D42A27DB-BD31-4B8C-83A1-F6EECF244321}">
+                    <p14:modId xmlns:p14="http://schemas.microsoft.com/office/powerpoint/2010/main" val="1680417465"/>
+                  </p:ext>
+                </p:extLst>
+              </p:nvPr>
+            </p:nvGraphicFramePr>
+            <p:xfrm>
+              <a:off x="1120775" y="1825625"/>
+              <a:ext cx="10233020" cy="4450080"/>
+            </p:xfrm>
+            <a:graphic>
+              <a:graphicData uri="http://schemas.openxmlformats.org/drawingml/2006/table">
+                <a:tbl>
+                  <a:tblPr firstRow="1" bandRow="1">
+                    <a:tableStyleId>{5C22544A-7EE6-4342-B048-85BDC9FD1C3A}</a:tableStyleId>
+                  </a:tblPr>
+                  <a:tblGrid>
+                    <a:gridCol w="1461860">
+                      <a:extLst>
+                        <a:ext uri="{9D8B030D-6E8A-4147-A177-3AD203B41FA5}">
+                          <a16:colId xmlns:a16="http://schemas.microsoft.com/office/drawing/2014/main" val="3179748796"/>
+                        </a:ext>
+                      </a:extLst>
+                    </a:gridCol>
+                    <a:gridCol w="1461860">
+                      <a:extLst>
+                        <a:ext uri="{9D8B030D-6E8A-4147-A177-3AD203B41FA5}">
+                          <a16:colId xmlns:a16="http://schemas.microsoft.com/office/drawing/2014/main" val="1982583210"/>
+                        </a:ext>
+                      </a:extLst>
+                    </a:gridCol>
+                    <a:gridCol w="1461860">
+                      <a:extLst>
+                        <a:ext uri="{9D8B030D-6E8A-4147-A177-3AD203B41FA5}">
+                          <a16:colId xmlns:a16="http://schemas.microsoft.com/office/drawing/2014/main" val="3345827443"/>
+                        </a:ext>
+                      </a:extLst>
+                    </a:gridCol>
+                    <a:gridCol w="1461860">
+                      <a:extLst>
+                        <a:ext uri="{9D8B030D-6E8A-4147-A177-3AD203B41FA5}">
+                          <a16:colId xmlns:a16="http://schemas.microsoft.com/office/drawing/2014/main" val="3221203264"/>
+                        </a:ext>
+                      </a:extLst>
+                    </a:gridCol>
+                    <a:gridCol w="1461860">
+                      <a:extLst>
+                        <a:ext uri="{9D8B030D-6E8A-4147-A177-3AD203B41FA5}">
+                          <a16:colId xmlns:a16="http://schemas.microsoft.com/office/drawing/2014/main" val="502688713"/>
+                        </a:ext>
+                      </a:extLst>
+                    </a:gridCol>
+                    <a:gridCol w="1461860">
+                      <a:extLst>
+                        <a:ext uri="{9D8B030D-6E8A-4147-A177-3AD203B41FA5}">
+                          <a16:colId xmlns:a16="http://schemas.microsoft.com/office/drawing/2014/main" val="2219946809"/>
+                        </a:ext>
+                      </a:extLst>
+                    </a:gridCol>
+                    <a:gridCol w="1461860">
+                      <a:extLst>
+                        <a:ext uri="{9D8B030D-6E8A-4147-A177-3AD203B41FA5}">
+                          <a16:colId xmlns:a16="http://schemas.microsoft.com/office/drawing/2014/main" val="2459791304"/>
+                        </a:ext>
+                      </a:extLst>
+                    </a:gridCol>
+                  </a:tblGrid>
+                  <a:tr h="370840">
+                    <a:tc>
+                      <a:txBody>
+                        <a:bodyPr/>
+                        <a:lstStyle/>
+                        <a:p>
+                          <a:endParaRPr lang="en-US" dirty="0"/>
+                        </a:p>
+                      </a:txBody>
+                      <a:tcPr>
+                        <a:solidFill>
+                          <a:schemeClr val="accent1"/>
+                        </a:solidFill>
+                      </a:tcPr>
+                    </a:tc>
+                    <a:tc gridSpan="2">
+                      <a:txBody>
+                        <a:bodyPr/>
+                        <a:lstStyle/>
+                        <a:p>
+                          <a:pPr algn="ctr"/>
+                          <a:r>
+                            <a:rPr lang="en-US" dirty="0"/>
+                            <a:t>Estimate</a:t>
+                          </a:r>
+                        </a:p>
+                      </a:txBody>
+                      <a:tcPr>
+                        <a:solidFill>
+                          <a:schemeClr val="accent1"/>
+                        </a:solidFill>
+                      </a:tcPr>
+                    </a:tc>
+                    <a:tc hMerge="1">
+                      <a:txBody>
+                        <a:bodyPr/>
+                        <a:lstStyle/>
+                        <a:p>
+                          <a:endParaRPr lang="en-US" dirty="0"/>
+                        </a:p>
+                      </a:txBody>
+                      <a:tcPr>
+                        <a:solidFill>
+                          <a:schemeClr val="accent1"/>
+                        </a:solidFill>
+                      </a:tcPr>
+                    </a:tc>
+                    <a:tc gridSpan="2">
+                      <a:txBody>
+                        <a:bodyPr/>
+                        <a:lstStyle/>
+                        <a:p>
+                          <a:pPr algn="ctr"/>
+                          <a:r>
+                            <a:rPr lang="en-US" dirty="0"/>
+                            <a:t>ESS</a:t>
+                          </a:r>
+                        </a:p>
+                      </a:txBody>
+                      <a:tcPr>
+                        <a:solidFill>
+                          <a:schemeClr val="accent1"/>
+                        </a:solidFill>
+                      </a:tcPr>
+                    </a:tc>
+                    <a:tc hMerge="1">
+                      <a:txBody>
+                        <a:bodyPr/>
+                        <a:lstStyle/>
+                        <a:p>
+                          <a:endParaRPr lang="en-US" dirty="0"/>
+                        </a:p>
+                      </a:txBody>
+                      <a:tcPr>
+                        <a:solidFill>
+                          <a:schemeClr val="accent1"/>
+                        </a:solidFill>
+                      </a:tcPr>
+                    </a:tc>
+                    <a:tc gridSpan="2">
+                      <a:txBody>
+                        <a:bodyPr/>
+                        <a:lstStyle/>
+                        <a:p>
+                          <a:pPr algn="ctr"/>
+                          <a:r>
+                            <a:rPr lang="en-US" dirty="0" err="1"/>
+                            <a:t>Rhat</a:t>
+                          </a:r>
+                          <a:endParaRPr lang="en-US" dirty="0"/>
+                        </a:p>
+                      </a:txBody>
+                      <a:tcPr>
+                        <a:solidFill>
+                          <a:schemeClr val="accent1"/>
+                        </a:solidFill>
+                      </a:tcPr>
+                    </a:tc>
+                    <a:tc hMerge="1">
+                      <a:txBody>
+                        <a:bodyPr/>
+                        <a:lstStyle/>
+                        <a:p>
+                          <a:endParaRPr lang="en-US" dirty="0"/>
+                        </a:p>
+                      </a:txBody>
+                      <a:tcPr>
+                        <a:solidFill>
+                          <a:schemeClr val="accent1"/>
+                        </a:solidFill>
+                      </a:tcPr>
+                    </a:tc>
+                    <a:extLst>
+                      <a:ext uri="{0D108BD9-81ED-4DB2-BD59-A6C34878D82A}">
+                        <a16:rowId xmlns:a16="http://schemas.microsoft.com/office/drawing/2014/main" val="2456736051"/>
+                      </a:ext>
+                    </a:extLst>
+                  </a:tr>
+                  <a:tr h="370840">
+                    <a:tc>
+                      <a:txBody>
+                        <a:bodyPr/>
+                        <a:lstStyle/>
+                        <a:p>
+                          <a:endParaRPr lang="en-US" dirty="0"/>
+                        </a:p>
+                      </a:txBody>
+                      <a:tcPr>
+                        <a:solidFill>
+                          <a:schemeClr val="accent1"/>
+                        </a:solidFill>
+                      </a:tcPr>
+                    </a:tc>
+                    <a:tc>
+                      <a:txBody>
+                        <a:bodyPr/>
+                        <a:lstStyle/>
+                        <a:p>
+                          <a:pPr algn="ctr"/>
+                          <a:r>
+                            <a:rPr lang="en-US" dirty="0"/>
+                            <a:t>Slice Sampler</a:t>
+                          </a:r>
+                        </a:p>
+                      </a:txBody>
+                      <a:tcPr>
+                        <a:solidFill>
+                          <a:schemeClr val="accent1"/>
+                        </a:solidFill>
+                      </a:tcPr>
+                    </a:tc>
+                    <a:tc>
+                      <a:txBody>
+                        <a:bodyPr/>
+                        <a:lstStyle/>
+                        <a:p>
+                          <a:pPr algn="ctr"/>
+                          <a:r>
+                            <a:rPr lang="en-US" dirty="0"/>
+                            <a:t>Stan</a:t>
+                          </a:r>
+                        </a:p>
+                      </a:txBody>
+                      <a:tcPr>
+                        <a:solidFill>
+                          <a:schemeClr val="accent1"/>
+                        </a:solidFill>
+                      </a:tcPr>
+                    </a:tc>
+                    <a:tc>
+                      <a:txBody>
+                        <a:bodyPr/>
+                        <a:lstStyle/>
+                        <a:p>
+                          <a:pPr algn="ctr"/>
+                          <a:r>
+                            <a:rPr lang="en-US" dirty="0"/>
+                            <a:t>Slice Sampler</a:t>
+                          </a:r>
+                        </a:p>
+                      </a:txBody>
+                      <a:tcPr>
+                        <a:solidFill>
+                          <a:schemeClr val="accent1"/>
+                        </a:solidFill>
+                      </a:tcPr>
+                    </a:tc>
+                    <a:tc>
+                      <a:txBody>
+                        <a:bodyPr/>
+                        <a:lstStyle/>
+                        <a:p>
+                          <a:pPr algn="ctr"/>
+                          <a:r>
+                            <a:rPr lang="en-US" dirty="0"/>
+                            <a:t>Stan</a:t>
+                          </a:r>
+                        </a:p>
+                      </a:txBody>
+                      <a:tcPr>
+                        <a:solidFill>
+                          <a:schemeClr val="accent1"/>
+                        </a:solidFill>
+                      </a:tcPr>
+                    </a:tc>
+                    <a:tc>
+                      <a:txBody>
+                        <a:bodyPr/>
+                        <a:lstStyle/>
+                        <a:p>
+                          <a:pPr algn="ctr"/>
+                          <a:r>
+                            <a:rPr lang="en-US" dirty="0"/>
+                            <a:t>Slice Sampler</a:t>
+                          </a:r>
+                        </a:p>
+                      </a:txBody>
+                      <a:tcPr>
+                        <a:solidFill>
+                          <a:schemeClr val="accent1"/>
+                        </a:solidFill>
+                      </a:tcPr>
+                    </a:tc>
+                    <a:tc>
+                      <a:txBody>
+                        <a:bodyPr/>
+                        <a:lstStyle/>
+                        <a:p>
+                          <a:pPr algn="ctr"/>
+                          <a:r>
+                            <a:rPr lang="en-US" dirty="0"/>
+                            <a:t>Stan</a:t>
+                          </a:r>
+                        </a:p>
+                      </a:txBody>
+                      <a:tcPr>
+                        <a:solidFill>
+                          <a:schemeClr val="accent1"/>
+                        </a:solidFill>
+                      </a:tcPr>
+                    </a:tc>
+                    <a:extLst>
+                      <a:ext uri="{0D108BD9-81ED-4DB2-BD59-A6C34878D82A}">
+                        <a16:rowId xmlns:a16="http://schemas.microsoft.com/office/drawing/2014/main" val="3931079199"/>
+                      </a:ext>
+                    </a:extLst>
+                  </a:tr>
+                  <a:tr h="370840">
+                    <a:tc>
+                      <a:txBody>
+                        <a:bodyPr/>
+                        <a:lstStyle/>
+                        <a:p>
+                          <a:pPr/>
+                          <a14:m>
+                            <m:oMathPara xmlns:m="http://schemas.openxmlformats.org/officeDocument/2006/math">
+                              <m:oMathParaPr>
+                                <m:jc m:val="centerGroup"/>
+                              </m:oMathParaPr>
+                              <m:oMath xmlns:m="http://schemas.openxmlformats.org/officeDocument/2006/math">
+                                <m:sSub>
+                                  <m:sSubPr>
+                                    <m:ctrlPr>
+                                      <a:rPr lang="en-US" b="0" i="1" smtClean="0">
+                                        <a:solidFill>
+                                          <a:schemeClr val="tx1"/>
+                                        </a:solidFill>
+                                        <a:latin typeface="Cambria Math" panose="02040503050406030204" pitchFamily="18" charset="0"/>
+                                      </a:rPr>
+                                    </m:ctrlPr>
+                                  </m:sSubPr>
+                                  <m:e>
+                                    <m:r>
+                                      <a:rPr lang="en-US" b="0" i="1" smtClean="0">
+                                        <a:solidFill>
+                                          <a:schemeClr val="tx1"/>
+                                        </a:solidFill>
+                                        <a:latin typeface="Cambria Math" panose="02040503050406030204" pitchFamily="18" charset="0"/>
+                                      </a:rPr>
+                                      <m:t>𝛽</m:t>
+                                    </m:r>
+                                  </m:e>
+                                  <m:sub>
+                                    <m:r>
+                                      <a:rPr lang="en-US" b="0" i="1" smtClean="0">
+                                        <a:solidFill>
+                                          <a:schemeClr val="tx1"/>
+                                        </a:solidFill>
+                                        <a:latin typeface="Cambria Math" panose="02040503050406030204" pitchFamily="18" charset="0"/>
+                                      </a:rPr>
+                                      <m:t>1</m:t>
+                                    </m:r>
+                                  </m:sub>
+                                </m:sSub>
+                              </m:oMath>
+                            </m:oMathPara>
+                          </a14:m>
+                          <a:endParaRPr lang="en-US" dirty="0">
+                            <a:solidFill>
+                              <a:schemeClr val="tx1"/>
+                            </a:solidFill>
+                          </a:endParaRPr>
+                        </a:p>
+                      </a:txBody>
+                      <a:tcPr>
+                        <a:solidFill>
+                          <a:schemeClr val="accent1"/>
+                        </a:solidFill>
+                      </a:tcPr>
+                    </a:tc>
+                    <a:tc>
+                      <a:txBody>
+                        <a:bodyPr/>
+                        <a:lstStyle/>
+                        <a:p>
+                          <a:pPr algn="r"/>
+                          <a:r>
+                            <a:rPr lang="en-US" dirty="0"/>
+                            <a:t>2.671</a:t>
+                          </a:r>
+                        </a:p>
+                      </a:txBody>
+                      <a:tcPr/>
+                    </a:tc>
+                    <a:tc>
+                      <a:txBody>
+                        <a:bodyPr/>
+                        <a:lstStyle/>
+                        <a:p>
+                          <a:pPr algn="r"/>
+                          <a:r>
+                            <a:rPr lang="en-US" dirty="0"/>
+                            <a:t>2.671</a:t>
+                          </a:r>
+                        </a:p>
+                      </a:txBody>
+                      <a:tcPr/>
+                    </a:tc>
+                    <a:tc>
+                      <a:txBody>
+                        <a:bodyPr/>
+                        <a:lstStyle/>
+                        <a:p>
+                          <a:pPr algn="r"/>
+                          <a:r>
+                            <a:rPr lang="en-US" dirty="0"/>
+                            <a:t>2252</a:t>
+                          </a:r>
+                        </a:p>
+                      </a:txBody>
+                      <a:tcPr/>
+                    </a:tc>
+                    <a:tc>
+                      <a:txBody>
+                        <a:bodyPr/>
+                        <a:lstStyle/>
+                        <a:p>
+                          <a:pPr algn="r"/>
+                          <a:r>
+                            <a:rPr lang="en-US" dirty="0"/>
+                            <a:t>21441</a:t>
+                          </a:r>
+                        </a:p>
+                      </a:txBody>
+                      <a:tcPr/>
+                    </a:tc>
+                    <a:tc>
+                      <a:txBody>
+                        <a:bodyPr/>
+                        <a:lstStyle/>
+                        <a:p>
+                          <a:pPr algn="r"/>
+                          <a:r>
+                            <a:rPr lang="en-US" dirty="0"/>
+                            <a:t>1.52</a:t>
+                          </a:r>
+                        </a:p>
+                      </a:txBody>
+                      <a:tcPr/>
+                    </a:tc>
+                    <a:tc>
+                      <a:txBody>
+                        <a:bodyPr/>
+                        <a:lstStyle/>
+                        <a:p>
+                          <a:pPr algn="r"/>
+                          <a:r>
+                            <a:rPr lang="en-US" dirty="0"/>
+                            <a:t>1</a:t>
+                          </a:r>
+                        </a:p>
+                      </a:txBody>
+                      <a:tcPr/>
+                    </a:tc>
+                    <a:extLst>
+                      <a:ext uri="{0D108BD9-81ED-4DB2-BD59-A6C34878D82A}">
+                        <a16:rowId xmlns:a16="http://schemas.microsoft.com/office/drawing/2014/main" val="3612399380"/>
+                      </a:ext>
+                    </a:extLst>
+                  </a:tr>
+                  <a:tr h="370840">
+                    <a:tc>
+                      <a:txBody>
+                        <a:bodyPr/>
+                        <a:lstStyle/>
+                        <a:p>
+                          <a:pPr/>
+                          <a14:m>
+                            <m:oMathPara xmlns:m="http://schemas.openxmlformats.org/officeDocument/2006/math">
+                              <m:oMathParaPr>
+                                <m:jc m:val="centerGroup"/>
+                              </m:oMathParaPr>
+                              <m:oMath xmlns:m="http://schemas.openxmlformats.org/officeDocument/2006/math">
+                                <m:sSub>
+                                  <m:sSubPr>
+                                    <m:ctrlPr>
+                                      <a:rPr lang="en-US" b="0" i="1" smtClean="0">
+                                        <a:solidFill>
+                                          <a:schemeClr val="tx1"/>
+                                        </a:solidFill>
+                                        <a:latin typeface="Cambria Math" panose="02040503050406030204" pitchFamily="18" charset="0"/>
+                                      </a:rPr>
+                                    </m:ctrlPr>
+                                  </m:sSubPr>
+                                  <m:e>
+                                    <m:r>
+                                      <a:rPr lang="en-US" b="0" i="1" smtClean="0">
+                                        <a:solidFill>
+                                          <a:schemeClr val="tx1"/>
+                                        </a:solidFill>
+                                        <a:latin typeface="Cambria Math" panose="02040503050406030204" pitchFamily="18" charset="0"/>
+                                      </a:rPr>
+                                      <m:t>𝛽</m:t>
+                                    </m:r>
+                                  </m:e>
+                                  <m:sub>
+                                    <m:r>
+                                      <a:rPr lang="en-US" b="0" i="1" smtClean="0">
+                                        <a:solidFill>
+                                          <a:schemeClr val="tx1"/>
+                                        </a:solidFill>
+                                        <a:latin typeface="Cambria Math" panose="02040503050406030204" pitchFamily="18" charset="0"/>
+                                      </a:rPr>
+                                      <m:t>2</m:t>
+                                    </m:r>
+                                  </m:sub>
+                                </m:sSub>
+                              </m:oMath>
+                            </m:oMathPara>
+                          </a14:m>
+                          <a:endParaRPr lang="en-US" dirty="0">
+                            <a:solidFill>
+                              <a:schemeClr val="tx1"/>
+                            </a:solidFill>
+                          </a:endParaRPr>
+                        </a:p>
+                      </a:txBody>
+                      <a:tcPr>
+                        <a:solidFill>
+                          <a:schemeClr val="accent1"/>
+                        </a:solidFill>
+                      </a:tcPr>
+                    </a:tc>
+                    <a:tc>
+                      <a:txBody>
+                        <a:bodyPr/>
+                        <a:lstStyle/>
+                        <a:p>
+                          <a:pPr algn="r"/>
+                          <a:r>
+                            <a:rPr lang="en-US" dirty="0"/>
+                            <a:t>-0.013</a:t>
+                          </a:r>
+                        </a:p>
+                      </a:txBody>
+                      <a:tcPr/>
+                    </a:tc>
+                    <a:tc>
+                      <a:txBody>
+                        <a:bodyPr/>
+                        <a:lstStyle/>
+                        <a:p>
+                          <a:pPr algn="r"/>
+                          <a:r>
+                            <a:rPr lang="en-US" dirty="0"/>
+                            <a:t>-0.013</a:t>
+                          </a:r>
+                        </a:p>
+                      </a:txBody>
+                      <a:tcPr/>
+                    </a:tc>
+                    <a:tc>
+                      <a:txBody>
+                        <a:bodyPr/>
+                        <a:lstStyle/>
+                        <a:p>
+                          <a:pPr algn="r"/>
+                          <a:r>
+                            <a:rPr lang="en-US" dirty="0"/>
+                            <a:t>2757</a:t>
+                          </a:r>
+                        </a:p>
+                      </a:txBody>
+                      <a:tcPr/>
+                    </a:tc>
+                    <a:tc>
+                      <a:txBody>
+                        <a:bodyPr/>
+                        <a:lstStyle/>
+                        <a:p>
+                          <a:pPr algn="r"/>
+                          <a:r>
+                            <a:rPr lang="en-US" dirty="0"/>
+                            <a:t>25318</a:t>
+                          </a:r>
+                        </a:p>
+                      </a:txBody>
+                      <a:tcPr/>
+                    </a:tc>
+                    <a:tc>
+                      <a:txBody>
+                        <a:bodyPr/>
+                        <a:lstStyle/>
+                        <a:p>
+                          <a:pPr algn="r"/>
+                          <a:r>
+                            <a:rPr lang="en-US" dirty="0"/>
+                            <a:t>1.33</a:t>
+                          </a:r>
+                        </a:p>
+                      </a:txBody>
+                      <a:tcPr/>
+                    </a:tc>
+                    <a:tc>
+                      <a:txBody>
+                        <a:bodyPr/>
+                        <a:lstStyle/>
+                        <a:p>
+                          <a:pPr algn="r"/>
+                          <a:r>
+                            <a:rPr lang="en-US" dirty="0"/>
+                            <a:t>1</a:t>
+                          </a:r>
+                        </a:p>
+                      </a:txBody>
+                      <a:tcPr/>
+                    </a:tc>
+                    <a:extLst>
+                      <a:ext uri="{0D108BD9-81ED-4DB2-BD59-A6C34878D82A}">
+                        <a16:rowId xmlns:a16="http://schemas.microsoft.com/office/drawing/2014/main" val="1115967027"/>
+                      </a:ext>
+                    </a:extLst>
+                  </a:tr>
+                  <a:tr h="370840">
+                    <a:tc>
+                      <a:txBody>
+                        <a:bodyPr/>
+                        <a:lstStyle/>
+                        <a:p>
+                          <a:pPr/>
+                          <a14:m>
+                            <m:oMathPara xmlns:m="http://schemas.openxmlformats.org/officeDocument/2006/math">
+                              <m:oMathParaPr>
+                                <m:jc m:val="centerGroup"/>
+                              </m:oMathParaPr>
+                              <m:oMath xmlns:m="http://schemas.openxmlformats.org/officeDocument/2006/math">
+                                <m:sSub>
+                                  <m:sSubPr>
+                                    <m:ctrlPr>
+                                      <a:rPr lang="en-US" b="0" i="1" smtClean="0">
+                                        <a:solidFill>
+                                          <a:schemeClr val="tx1"/>
+                                        </a:solidFill>
+                                        <a:latin typeface="Cambria Math" panose="02040503050406030204" pitchFamily="18" charset="0"/>
+                                      </a:rPr>
+                                    </m:ctrlPr>
+                                  </m:sSubPr>
+                                  <m:e>
+                                    <m:r>
+                                      <a:rPr lang="en-US" b="0" i="1" smtClean="0">
+                                        <a:solidFill>
+                                          <a:schemeClr val="tx1"/>
+                                        </a:solidFill>
+                                        <a:latin typeface="Cambria Math" panose="02040503050406030204" pitchFamily="18" charset="0"/>
+                                      </a:rPr>
+                                      <m:t>𝛽</m:t>
+                                    </m:r>
+                                  </m:e>
+                                  <m:sub>
+                                    <m:r>
+                                      <a:rPr lang="en-US" b="0" i="1" smtClean="0">
+                                        <a:solidFill>
+                                          <a:schemeClr val="tx1"/>
+                                        </a:solidFill>
+                                        <a:latin typeface="Cambria Math" panose="02040503050406030204" pitchFamily="18" charset="0"/>
+                                      </a:rPr>
+                                      <m:t>3</m:t>
+                                    </m:r>
+                                  </m:sub>
+                                </m:sSub>
+                              </m:oMath>
+                            </m:oMathPara>
+                          </a14:m>
+                          <a:endParaRPr lang="en-US" dirty="0">
+                            <a:solidFill>
+                              <a:schemeClr val="tx1"/>
+                            </a:solidFill>
+                          </a:endParaRPr>
+                        </a:p>
+                      </a:txBody>
+                      <a:tcPr>
+                        <a:solidFill>
+                          <a:schemeClr val="accent1"/>
+                        </a:solidFill>
+                      </a:tcPr>
+                    </a:tc>
+                    <a:tc>
+                      <a:txBody>
+                        <a:bodyPr/>
+                        <a:lstStyle/>
+                        <a:p>
+                          <a:pPr algn="r"/>
+                          <a:r>
+                            <a:rPr lang="en-US" dirty="0"/>
+                            <a:t>0.108</a:t>
+                          </a:r>
+                        </a:p>
+                      </a:txBody>
+                      <a:tcPr/>
+                    </a:tc>
+                    <a:tc>
+                      <a:txBody>
+                        <a:bodyPr/>
+                        <a:lstStyle/>
+                        <a:p>
+                          <a:pPr algn="r"/>
+                          <a:r>
+                            <a:rPr lang="en-US" dirty="0"/>
+                            <a:t>0.107</a:t>
+                          </a:r>
+                        </a:p>
+                      </a:txBody>
+                      <a:tcPr/>
+                    </a:tc>
+                    <a:tc>
+                      <a:txBody>
+                        <a:bodyPr/>
+                        <a:lstStyle/>
+                        <a:p>
+                          <a:pPr algn="r"/>
+                          <a:r>
+                            <a:rPr lang="en-US" dirty="0"/>
+                            <a:t>4714</a:t>
+                          </a:r>
+                        </a:p>
+                      </a:txBody>
+                      <a:tcPr/>
+                    </a:tc>
+                    <a:tc>
+                      <a:txBody>
+                        <a:bodyPr/>
+                        <a:lstStyle/>
+                        <a:p>
+                          <a:pPr algn="r"/>
+                          <a:r>
+                            <a:rPr lang="en-US" dirty="0"/>
+                            <a:t>35126</a:t>
+                          </a:r>
+                        </a:p>
+                      </a:txBody>
+                      <a:tcPr/>
+                    </a:tc>
+                    <a:tc>
+                      <a:txBody>
+                        <a:bodyPr/>
+                        <a:lstStyle/>
+                        <a:p>
+                          <a:pPr algn="r"/>
+                          <a:r>
+                            <a:rPr lang="en-US" dirty="0"/>
+                            <a:t>1.48</a:t>
+                          </a:r>
+                        </a:p>
+                      </a:txBody>
+                      <a:tcPr/>
+                    </a:tc>
+                    <a:tc>
+                      <a:txBody>
+                        <a:bodyPr/>
+                        <a:lstStyle/>
+                        <a:p>
+                          <a:pPr algn="r"/>
+                          <a:r>
+                            <a:rPr lang="en-US" dirty="0"/>
+                            <a:t>1</a:t>
+                          </a:r>
+                        </a:p>
+                      </a:txBody>
+                      <a:tcPr/>
+                    </a:tc>
+                    <a:extLst>
+                      <a:ext uri="{0D108BD9-81ED-4DB2-BD59-A6C34878D82A}">
+                        <a16:rowId xmlns:a16="http://schemas.microsoft.com/office/drawing/2014/main" val="3276162553"/>
+                      </a:ext>
+                    </a:extLst>
+                  </a:tr>
+                  <a:tr h="370840">
+                    <a:tc>
+                      <a:txBody>
+                        <a:bodyPr/>
+                        <a:lstStyle/>
+                        <a:p>
+                          <a:pPr/>
+                          <a14:m>
+                            <m:oMathPara xmlns:m="http://schemas.openxmlformats.org/officeDocument/2006/math">
+                              <m:oMathParaPr>
+                                <m:jc m:val="centerGroup"/>
+                              </m:oMathParaPr>
+                              <m:oMath xmlns:m="http://schemas.openxmlformats.org/officeDocument/2006/math">
+                                <m:sSub>
+                                  <m:sSubPr>
+                                    <m:ctrlPr>
+                                      <a:rPr lang="en-US" b="0" i="1" smtClean="0">
+                                        <a:solidFill>
+                                          <a:schemeClr val="tx1"/>
+                                        </a:solidFill>
+                                        <a:latin typeface="Cambria Math" panose="02040503050406030204" pitchFamily="18" charset="0"/>
+                                      </a:rPr>
+                                    </m:ctrlPr>
+                                  </m:sSubPr>
+                                  <m:e>
+                                    <m:r>
+                                      <a:rPr lang="en-US" b="0" i="1" smtClean="0">
+                                        <a:solidFill>
+                                          <a:schemeClr val="tx1"/>
+                                        </a:solidFill>
+                                        <a:latin typeface="Cambria Math" panose="02040503050406030204" pitchFamily="18" charset="0"/>
+                                      </a:rPr>
+                                      <m:t>𝛽</m:t>
+                                    </m:r>
+                                  </m:e>
+                                  <m:sub>
+                                    <m:r>
+                                      <a:rPr lang="en-US" b="0" i="1" smtClean="0">
+                                        <a:solidFill>
+                                          <a:schemeClr val="tx1"/>
+                                        </a:solidFill>
+                                        <a:latin typeface="Cambria Math" panose="02040503050406030204" pitchFamily="18" charset="0"/>
+                                      </a:rPr>
+                                      <m:t>4</m:t>
+                                    </m:r>
+                                  </m:sub>
+                                </m:sSub>
+                              </m:oMath>
+                            </m:oMathPara>
+                          </a14:m>
+                          <a:endParaRPr lang="en-US" dirty="0">
+                            <a:solidFill>
+                              <a:schemeClr val="tx1"/>
+                            </a:solidFill>
+                          </a:endParaRPr>
+                        </a:p>
+                      </a:txBody>
+                      <a:tcPr>
+                        <a:solidFill>
+                          <a:schemeClr val="accent1"/>
+                        </a:solidFill>
+                      </a:tcPr>
+                    </a:tc>
+                    <a:tc>
+                      <a:txBody>
+                        <a:bodyPr/>
+                        <a:lstStyle/>
+                        <a:p>
+                          <a:pPr algn="r"/>
+                          <a:r>
+                            <a:rPr lang="en-US" dirty="0"/>
+                            <a:t>0.062</a:t>
+                          </a:r>
+                        </a:p>
+                      </a:txBody>
+                      <a:tcPr/>
+                    </a:tc>
+                    <a:tc>
+                      <a:txBody>
+                        <a:bodyPr/>
+                        <a:lstStyle/>
+                        <a:p>
+                          <a:pPr algn="r"/>
+                          <a:r>
+                            <a:rPr lang="en-US" dirty="0"/>
+                            <a:t>0.062</a:t>
+                          </a:r>
+                        </a:p>
+                      </a:txBody>
+                      <a:tcPr/>
+                    </a:tc>
+                    <a:tc>
+                      <a:txBody>
+                        <a:bodyPr/>
+                        <a:lstStyle/>
+                        <a:p>
+                          <a:pPr algn="r"/>
+                          <a:r>
+                            <a:rPr lang="en-US" dirty="0"/>
+                            <a:t>2695</a:t>
+                          </a:r>
+                        </a:p>
+                      </a:txBody>
+                      <a:tcPr/>
+                    </a:tc>
+                    <a:tc>
+                      <a:txBody>
+                        <a:bodyPr/>
+                        <a:lstStyle/>
+                        <a:p>
+                          <a:pPr algn="r"/>
+                          <a:r>
+                            <a:rPr lang="en-US" dirty="0"/>
+                            <a:t>25432</a:t>
+                          </a:r>
+                        </a:p>
+                      </a:txBody>
+                      <a:tcPr/>
+                    </a:tc>
+                    <a:tc>
+                      <a:txBody>
+                        <a:bodyPr/>
+                        <a:lstStyle/>
+                        <a:p>
+                          <a:pPr algn="r"/>
+                          <a:r>
+                            <a:rPr lang="en-US" dirty="0"/>
+                            <a:t>1.47</a:t>
+                          </a:r>
+                        </a:p>
+                      </a:txBody>
+                      <a:tcPr/>
+                    </a:tc>
+                    <a:tc>
+                      <a:txBody>
+                        <a:bodyPr/>
+                        <a:lstStyle/>
+                        <a:p>
+                          <a:pPr algn="r"/>
+                          <a:r>
+                            <a:rPr lang="en-US" dirty="0"/>
+                            <a:t>1</a:t>
+                          </a:r>
+                        </a:p>
+                      </a:txBody>
+                      <a:tcPr/>
+                    </a:tc>
+                    <a:extLst>
+                      <a:ext uri="{0D108BD9-81ED-4DB2-BD59-A6C34878D82A}">
+                        <a16:rowId xmlns:a16="http://schemas.microsoft.com/office/drawing/2014/main" val="1343808930"/>
+                      </a:ext>
+                    </a:extLst>
+                  </a:tr>
+                  <a:tr h="370840">
+                    <a:tc>
+                      <a:txBody>
+                        <a:bodyPr/>
+                        <a:lstStyle/>
+                        <a:p>
+                          <a:pPr/>
+                          <a14:m>
+                            <m:oMathPara xmlns:m="http://schemas.openxmlformats.org/officeDocument/2006/math">
+                              <m:oMathParaPr>
+                                <m:jc m:val="centerGroup"/>
+                              </m:oMathParaPr>
+                              <m:oMath xmlns:m="http://schemas.openxmlformats.org/officeDocument/2006/math">
+                                <m:sSub>
+                                  <m:sSubPr>
+                                    <m:ctrlPr>
+                                      <a:rPr lang="en-US" b="0" i="1" smtClean="0">
+                                        <a:solidFill>
+                                          <a:schemeClr val="tx1"/>
+                                        </a:solidFill>
+                                        <a:latin typeface="Cambria Math" panose="02040503050406030204" pitchFamily="18" charset="0"/>
+                                      </a:rPr>
+                                    </m:ctrlPr>
+                                  </m:sSubPr>
+                                  <m:e>
+                                    <m:r>
+                                      <a:rPr lang="en-US" b="0" i="1" smtClean="0">
+                                        <a:solidFill>
+                                          <a:schemeClr val="tx1"/>
+                                        </a:solidFill>
+                                        <a:latin typeface="Cambria Math" panose="02040503050406030204" pitchFamily="18" charset="0"/>
+                                      </a:rPr>
+                                      <m:t>𝛽</m:t>
+                                    </m:r>
+                                  </m:e>
+                                  <m:sub>
+                                    <m:r>
+                                      <a:rPr lang="en-US" b="0" i="1" smtClean="0">
+                                        <a:solidFill>
+                                          <a:schemeClr val="tx1"/>
+                                        </a:solidFill>
+                                        <a:latin typeface="Cambria Math" panose="02040503050406030204" pitchFamily="18" charset="0"/>
+                                      </a:rPr>
+                                      <m:t>5</m:t>
+                                    </m:r>
+                                  </m:sub>
+                                </m:sSub>
+                              </m:oMath>
+                            </m:oMathPara>
+                          </a14:m>
+                          <a:endParaRPr lang="en-US" dirty="0">
+                            <a:solidFill>
+                              <a:schemeClr val="tx1"/>
+                            </a:solidFill>
+                          </a:endParaRPr>
+                        </a:p>
+                      </a:txBody>
+                      <a:tcPr>
+                        <a:solidFill>
+                          <a:schemeClr val="accent1"/>
+                        </a:solidFill>
+                      </a:tcPr>
+                    </a:tc>
+                    <a:tc>
+                      <a:txBody>
+                        <a:bodyPr/>
+                        <a:lstStyle/>
+                        <a:p>
+                          <a:pPr algn="r"/>
+                          <a:r>
+                            <a:rPr lang="en-US" dirty="0"/>
+                            <a:t>-0.149</a:t>
+                          </a:r>
+                        </a:p>
+                      </a:txBody>
+                      <a:tcPr/>
+                    </a:tc>
+                    <a:tc>
+                      <a:txBody>
+                        <a:bodyPr/>
+                        <a:lstStyle/>
+                        <a:p>
+                          <a:pPr algn="r"/>
+                          <a:r>
+                            <a:rPr lang="en-US" dirty="0"/>
+                            <a:t>-0.149</a:t>
+                          </a:r>
+                        </a:p>
+                      </a:txBody>
+                      <a:tcPr/>
+                    </a:tc>
+                    <a:tc>
+                      <a:txBody>
+                        <a:bodyPr/>
+                        <a:lstStyle/>
+                        <a:p>
+                          <a:pPr algn="r"/>
+                          <a:r>
+                            <a:rPr lang="en-US" dirty="0"/>
+                            <a:t>3133</a:t>
+                          </a:r>
+                        </a:p>
+                      </a:txBody>
+                      <a:tcPr/>
+                    </a:tc>
+                    <a:tc>
+                      <a:txBody>
+                        <a:bodyPr/>
+                        <a:lstStyle/>
+                        <a:p>
+                          <a:pPr algn="r"/>
+                          <a:r>
+                            <a:rPr lang="en-US" dirty="0"/>
+                            <a:t>28564</a:t>
+                          </a:r>
+                        </a:p>
+                      </a:txBody>
+                      <a:tcPr/>
+                    </a:tc>
+                    <a:tc>
+                      <a:txBody>
+                        <a:bodyPr/>
+                        <a:lstStyle/>
+                        <a:p>
+                          <a:pPr algn="r"/>
+                          <a:r>
+                            <a:rPr lang="en-US" dirty="0"/>
+                            <a:t>1.52</a:t>
+                          </a:r>
+                        </a:p>
+                      </a:txBody>
+                      <a:tcPr/>
+                    </a:tc>
+                    <a:tc>
+                      <a:txBody>
+                        <a:bodyPr/>
+                        <a:lstStyle/>
+                        <a:p>
+                          <a:pPr algn="r"/>
+                          <a:r>
+                            <a:rPr lang="en-US" dirty="0"/>
+                            <a:t>1</a:t>
+                          </a:r>
+                        </a:p>
+                      </a:txBody>
+                      <a:tcPr/>
+                    </a:tc>
+                    <a:extLst>
+                      <a:ext uri="{0D108BD9-81ED-4DB2-BD59-A6C34878D82A}">
+                        <a16:rowId xmlns:a16="http://schemas.microsoft.com/office/drawing/2014/main" val="2480711303"/>
+                      </a:ext>
+                    </a:extLst>
+                  </a:tr>
+                  <a:tr h="370840">
+                    <a:tc>
+                      <a:txBody>
+                        <a:bodyPr/>
+                        <a:lstStyle/>
+                        <a:p>
+                          <a:pPr/>
+                          <a14:m>
+                            <m:oMathPara xmlns:m="http://schemas.openxmlformats.org/officeDocument/2006/math">
+                              <m:oMathParaPr>
+                                <m:jc m:val="centerGroup"/>
+                              </m:oMathParaPr>
+                              <m:oMath xmlns:m="http://schemas.openxmlformats.org/officeDocument/2006/math">
+                                <m:sSub>
+                                  <m:sSubPr>
+                                    <m:ctrlPr>
+                                      <a:rPr lang="en-US" b="0" i="1" smtClean="0">
+                                        <a:solidFill>
+                                          <a:schemeClr val="tx1"/>
+                                        </a:solidFill>
+                                        <a:latin typeface="Cambria Math" panose="02040503050406030204" pitchFamily="18" charset="0"/>
+                                      </a:rPr>
+                                    </m:ctrlPr>
+                                  </m:sSubPr>
+                                  <m:e>
+                                    <m:r>
+                                      <a:rPr lang="en-US" b="0" i="1" smtClean="0">
+                                        <a:solidFill>
+                                          <a:schemeClr val="tx1"/>
+                                        </a:solidFill>
+                                        <a:latin typeface="Cambria Math" panose="02040503050406030204" pitchFamily="18" charset="0"/>
+                                      </a:rPr>
+                                      <m:t>𝛽</m:t>
+                                    </m:r>
+                                  </m:e>
+                                  <m:sub>
+                                    <m:r>
+                                      <a:rPr lang="en-US" b="0" i="1" smtClean="0">
+                                        <a:solidFill>
+                                          <a:schemeClr val="tx1"/>
+                                        </a:solidFill>
+                                        <a:latin typeface="Cambria Math" panose="02040503050406030204" pitchFamily="18" charset="0"/>
+                                      </a:rPr>
+                                      <m:t>6</m:t>
+                                    </m:r>
+                                  </m:sub>
+                                </m:sSub>
+                              </m:oMath>
+                            </m:oMathPara>
+                          </a14:m>
+                          <a:endParaRPr lang="en-US" dirty="0">
+                            <a:solidFill>
+                              <a:schemeClr val="tx1"/>
+                            </a:solidFill>
+                          </a:endParaRPr>
+                        </a:p>
+                      </a:txBody>
+                      <a:tcPr>
+                        <a:solidFill>
+                          <a:schemeClr val="accent1"/>
+                        </a:solidFill>
+                      </a:tcPr>
+                    </a:tc>
+                    <a:tc>
+                      <a:txBody>
+                        <a:bodyPr/>
+                        <a:lstStyle/>
+                        <a:p>
+                          <a:pPr algn="r"/>
+                          <a:r>
+                            <a:rPr lang="en-US" dirty="0"/>
+                            <a:t>0.731</a:t>
+                          </a:r>
+                        </a:p>
+                      </a:txBody>
+                      <a:tcPr/>
+                    </a:tc>
+                    <a:tc>
+                      <a:txBody>
+                        <a:bodyPr/>
+                        <a:lstStyle/>
+                        <a:p>
+                          <a:pPr algn="r"/>
+                          <a:r>
+                            <a:rPr lang="en-US" dirty="0"/>
+                            <a:t>0.731</a:t>
+                          </a:r>
+                        </a:p>
+                      </a:txBody>
+                      <a:tcPr/>
+                    </a:tc>
+                    <a:tc>
+                      <a:txBody>
+                        <a:bodyPr/>
+                        <a:lstStyle/>
+                        <a:p>
+                          <a:pPr algn="r"/>
+                          <a:r>
+                            <a:rPr lang="en-US" dirty="0"/>
+                            <a:t>7986</a:t>
+                          </a:r>
+                        </a:p>
+                      </a:txBody>
+                      <a:tcPr/>
+                    </a:tc>
+                    <a:tc>
+                      <a:txBody>
+                        <a:bodyPr/>
+                        <a:lstStyle/>
+                        <a:p>
+                          <a:pPr algn="r"/>
+                          <a:r>
+                            <a:rPr lang="en-US" dirty="0"/>
+                            <a:t>45810</a:t>
+                          </a:r>
+                        </a:p>
+                      </a:txBody>
+                      <a:tcPr/>
+                    </a:tc>
+                    <a:tc>
+                      <a:txBody>
+                        <a:bodyPr/>
+                        <a:lstStyle/>
+                        <a:p>
+                          <a:pPr algn="r"/>
+                          <a:r>
+                            <a:rPr lang="en-US" dirty="0"/>
+                            <a:t>1.52</a:t>
+                          </a:r>
+                        </a:p>
+                      </a:txBody>
+                      <a:tcPr/>
+                    </a:tc>
+                    <a:tc>
+                      <a:txBody>
+                        <a:bodyPr/>
+                        <a:lstStyle/>
+                        <a:p>
+                          <a:pPr algn="r"/>
+                          <a:r>
+                            <a:rPr lang="en-US" dirty="0"/>
+                            <a:t>1</a:t>
+                          </a:r>
+                        </a:p>
+                      </a:txBody>
+                      <a:tcPr/>
+                    </a:tc>
+                    <a:extLst>
+                      <a:ext uri="{0D108BD9-81ED-4DB2-BD59-A6C34878D82A}">
+                        <a16:rowId xmlns:a16="http://schemas.microsoft.com/office/drawing/2014/main" val="907850554"/>
+                      </a:ext>
+                    </a:extLst>
+                  </a:tr>
+                  <a:tr h="370840">
+                    <a:tc>
+                      <a:txBody>
+                        <a:bodyPr/>
+                        <a:lstStyle/>
+                        <a:p>
+                          <a:pPr/>
+                          <a14:m>
+                            <m:oMathPara xmlns:m="http://schemas.openxmlformats.org/officeDocument/2006/math">
+                              <m:oMathParaPr>
+                                <m:jc m:val="centerGroup"/>
+                              </m:oMathParaPr>
+                              <m:oMath xmlns:m="http://schemas.openxmlformats.org/officeDocument/2006/math">
+                                <m:sSub>
+                                  <m:sSubPr>
+                                    <m:ctrlPr>
+                                      <a:rPr lang="en-US" b="0" i="1" smtClean="0">
+                                        <a:solidFill>
+                                          <a:schemeClr val="tx1"/>
+                                        </a:solidFill>
+                                        <a:latin typeface="Cambria Math" panose="02040503050406030204" pitchFamily="18" charset="0"/>
+                                      </a:rPr>
+                                    </m:ctrlPr>
+                                  </m:sSubPr>
+                                  <m:e>
+                                    <m:r>
+                                      <a:rPr lang="en-US" b="0" i="1" smtClean="0">
+                                        <a:solidFill>
+                                          <a:schemeClr val="tx1"/>
+                                        </a:solidFill>
+                                        <a:latin typeface="Cambria Math" panose="02040503050406030204" pitchFamily="18" charset="0"/>
+                                      </a:rPr>
+                                      <m:t>𝛽</m:t>
+                                    </m:r>
+                                  </m:e>
+                                  <m:sub>
+                                    <m:r>
+                                      <a:rPr lang="en-US" b="0" i="1" smtClean="0">
+                                        <a:solidFill>
+                                          <a:schemeClr val="tx1"/>
+                                        </a:solidFill>
+                                        <a:latin typeface="Cambria Math" panose="02040503050406030204" pitchFamily="18" charset="0"/>
+                                      </a:rPr>
+                                      <m:t>7</m:t>
+                                    </m:r>
+                                  </m:sub>
+                                </m:sSub>
+                              </m:oMath>
+                            </m:oMathPara>
+                          </a14:m>
+                          <a:endParaRPr lang="en-US" dirty="0">
+                            <a:solidFill>
+                              <a:schemeClr val="tx1"/>
+                            </a:solidFill>
+                          </a:endParaRPr>
+                        </a:p>
+                      </a:txBody>
+                      <a:tcPr>
+                        <a:solidFill>
+                          <a:schemeClr val="accent1"/>
+                        </a:solidFill>
+                      </a:tcPr>
+                    </a:tc>
+                    <a:tc>
+                      <a:txBody>
+                        <a:bodyPr/>
+                        <a:lstStyle/>
+                        <a:p>
+                          <a:pPr algn="r"/>
+                          <a:r>
+                            <a:rPr lang="en-US" dirty="0"/>
+                            <a:t>-0.037</a:t>
+                          </a:r>
+                        </a:p>
+                      </a:txBody>
+                      <a:tcPr/>
+                    </a:tc>
+                    <a:tc>
+                      <a:txBody>
+                        <a:bodyPr/>
+                        <a:lstStyle/>
+                        <a:p>
+                          <a:pPr algn="r"/>
+                          <a:r>
+                            <a:rPr lang="en-US" dirty="0"/>
+                            <a:t>-0.036</a:t>
+                          </a:r>
+                        </a:p>
+                      </a:txBody>
+                      <a:tcPr/>
+                    </a:tc>
+                    <a:tc>
+                      <a:txBody>
+                        <a:bodyPr/>
+                        <a:lstStyle/>
+                        <a:p>
+                          <a:pPr algn="r"/>
+                          <a:r>
+                            <a:rPr lang="en-US" dirty="0"/>
+                            <a:t>3532</a:t>
+                          </a:r>
+                        </a:p>
+                      </a:txBody>
+                      <a:tcPr/>
+                    </a:tc>
+                    <a:tc>
+                      <a:txBody>
+                        <a:bodyPr/>
+                        <a:lstStyle/>
+                        <a:p>
+                          <a:pPr algn="r"/>
+                          <a:r>
+                            <a:rPr lang="en-US" dirty="0"/>
+                            <a:t>30704</a:t>
+                          </a:r>
+                        </a:p>
+                      </a:txBody>
+                      <a:tcPr/>
+                    </a:tc>
+                    <a:tc>
+                      <a:txBody>
+                        <a:bodyPr/>
+                        <a:lstStyle/>
+                        <a:p>
+                          <a:pPr algn="r"/>
+                          <a:r>
+                            <a:rPr lang="en-US" dirty="0"/>
+                            <a:t>1.13</a:t>
+                          </a:r>
+                        </a:p>
+                      </a:txBody>
+                      <a:tcPr/>
+                    </a:tc>
+                    <a:tc>
+                      <a:txBody>
+                        <a:bodyPr/>
+                        <a:lstStyle/>
+                        <a:p>
+                          <a:pPr algn="r"/>
+                          <a:r>
+                            <a:rPr lang="en-US" dirty="0"/>
+                            <a:t>1</a:t>
+                          </a:r>
+                        </a:p>
+                      </a:txBody>
+                      <a:tcPr/>
+                    </a:tc>
+                    <a:extLst>
+                      <a:ext uri="{0D108BD9-81ED-4DB2-BD59-A6C34878D82A}">
+                        <a16:rowId xmlns:a16="http://schemas.microsoft.com/office/drawing/2014/main" val="3785184036"/>
+                      </a:ext>
+                    </a:extLst>
+                  </a:tr>
+                  <a:tr h="370840">
+                    <a:tc>
+                      <a:txBody>
+                        <a:bodyPr/>
+                        <a:lstStyle/>
+                        <a:p>
+                          <a:pPr/>
+                          <a14:m>
+                            <m:oMathPara xmlns:m="http://schemas.openxmlformats.org/officeDocument/2006/math">
+                              <m:oMathParaPr>
+                                <m:jc m:val="centerGroup"/>
+                              </m:oMathParaPr>
+                              <m:oMath xmlns:m="http://schemas.openxmlformats.org/officeDocument/2006/math">
+                                <m:sSub>
+                                  <m:sSubPr>
+                                    <m:ctrlPr>
+                                      <a:rPr lang="en-US" b="0" i="1" smtClean="0">
+                                        <a:solidFill>
+                                          <a:schemeClr val="tx1"/>
+                                        </a:solidFill>
+                                        <a:latin typeface="Cambria Math" panose="02040503050406030204" pitchFamily="18" charset="0"/>
+                                      </a:rPr>
+                                    </m:ctrlPr>
+                                  </m:sSubPr>
+                                  <m:e>
+                                    <m:r>
+                                      <a:rPr lang="en-US" b="0" i="1" smtClean="0">
+                                        <a:solidFill>
+                                          <a:schemeClr val="tx1"/>
+                                        </a:solidFill>
+                                        <a:latin typeface="Cambria Math" panose="02040503050406030204" pitchFamily="18" charset="0"/>
+                                      </a:rPr>
+                                      <m:t>𝛽</m:t>
+                                    </m:r>
+                                  </m:e>
+                                  <m:sub>
+                                    <m:r>
+                                      <a:rPr lang="en-US" b="0" i="1" smtClean="0">
+                                        <a:solidFill>
+                                          <a:schemeClr val="tx1"/>
+                                        </a:solidFill>
+                                        <a:latin typeface="Cambria Math" panose="02040503050406030204" pitchFamily="18" charset="0"/>
+                                      </a:rPr>
+                                      <m:t>8</m:t>
+                                    </m:r>
+                                  </m:sub>
+                                </m:sSub>
+                              </m:oMath>
+                            </m:oMathPara>
+                          </a14:m>
+                          <a:endParaRPr lang="en-US" dirty="0">
+                            <a:solidFill>
+                              <a:schemeClr val="tx1"/>
+                            </a:solidFill>
+                          </a:endParaRPr>
+                        </a:p>
+                      </a:txBody>
+                      <a:tcPr>
+                        <a:solidFill>
+                          <a:schemeClr val="accent1"/>
+                        </a:solidFill>
+                      </a:tcPr>
+                    </a:tc>
+                    <a:tc>
+                      <a:txBody>
+                        <a:bodyPr/>
+                        <a:lstStyle/>
+                        <a:p>
+                          <a:pPr algn="r"/>
+                          <a:r>
+                            <a:rPr lang="en-US" dirty="0"/>
+                            <a:t>0.025</a:t>
+                          </a:r>
+                        </a:p>
+                      </a:txBody>
+                      <a:tcPr/>
+                    </a:tc>
+                    <a:tc>
+                      <a:txBody>
+                        <a:bodyPr/>
+                        <a:lstStyle/>
+                        <a:p>
+                          <a:pPr algn="r"/>
+                          <a:r>
+                            <a:rPr lang="en-US" dirty="0"/>
+                            <a:t>0.025</a:t>
+                          </a:r>
+                        </a:p>
+                      </a:txBody>
+                      <a:tcPr/>
+                    </a:tc>
+                    <a:tc>
+                      <a:txBody>
+                        <a:bodyPr/>
+                        <a:lstStyle/>
+                        <a:p>
+                          <a:pPr algn="r"/>
+                          <a:r>
+                            <a:rPr lang="en-US" dirty="0"/>
+                            <a:t>8294</a:t>
+                          </a:r>
+                        </a:p>
+                      </a:txBody>
+                      <a:tcPr/>
+                    </a:tc>
+                    <a:tc>
+                      <a:txBody>
+                        <a:bodyPr/>
+                        <a:lstStyle/>
+                        <a:p>
+                          <a:pPr algn="r"/>
+                          <a:r>
+                            <a:rPr lang="en-US" dirty="0"/>
+                            <a:t>50664</a:t>
+                          </a:r>
+                        </a:p>
+                      </a:txBody>
+                      <a:tcPr/>
+                    </a:tc>
+                    <a:tc>
+                      <a:txBody>
+                        <a:bodyPr/>
+                        <a:lstStyle/>
+                        <a:p>
+                          <a:pPr algn="r"/>
+                          <a:r>
+                            <a:rPr lang="en-US" dirty="0"/>
+                            <a:t>1.50</a:t>
+                          </a:r>
+                        </a:p>
+                      </a:txBody>
+                      <a:tcPr/>
+                    </a:tc>
+                    <a:tc>
+                      <a:txBody>
+                        <a:bodyPr/>
+                        <a:lstStyle/>
+                        <a:p>
+                          <a:pPr algn="r"/>
+                          <a:r>
+                            <a:rPr lang="en-US" dirty="0"/>
+                            <a:t>1</a:t>
+                          </a:r>
+                        </a:p>
+                      </a:txBody>
+                      <a:tcPr/>
+                    </a:tc>
+                    <a:extLst>
+                      <a:ext uri="{0D108BD9-81ED-4DB2-BD59-A6C34878D82A}">
+                        <a16:rowId xmlns:a16="http://schemas.microsoft.com/office/drawing/2014/main" val="1353458003"/>
+                      </a:ext>
+                    </a:extLst>
+                  </a:tr>
+                  <a:tr h="370840">
+                    <a:tc>
+                      <a:txBody>
+                        <a:bodyPr/>
+                        <a:lstStyle/>
+                        <a:p>
+                          <a:pPr/>
+                          <a14:m>
+                            <m:oMathPara xmlns:m="http://schemas.openxmlformats.org/officeDocument/2006/math">
+                              <m:oMathParaPr>
+                                <m:jc m:val="centerGroup"/>
+                              </m:oMathParaPr>
+                              <m:oMath xmlns:m="http://schemas.openxmlformats.org/officeDocument/2006/math">
+                                <m:sSub>
+                                  <m:sSubPr>
+                                    <m:ctrlPr>
+                                      <a:rPr lang="en-US" b="0" i="1" smtClean="0">
+                                        <a:solidFill>
+                                          <a:schemeClr val="tx1"/>
+                                        </a:solidFill>
+                                        <a:latin typeface="Cambria Math" panose="02040503050406030204" pitchFamily="18" charset="0"/>
+                                      </a:rPr>
+                                    </m:ctrlPr>
+                                  </m:sSubPr>
+                                  <m:e>
+                                    <m:r>
+                                      <a:rPr lang="en-US" b="0" i="1" smtClean="0">
+                                        <a:solidFill>
+                                          <a:schemeClr val="tx1"/>
+                                        </a:solidFill>
+                                        <a:latin typeface="Cambria Math" panose="02040503050406030204" pitchFamily="18" charset="0"/>
+                                      </a:rPr>
+                                      <m:t>𝛽</m:t>
+                                    </m:r>
+                                  </m:e>
+                                  <m:sub>
+                                    <m:r>
+                                      <a:rPr lang="en-US" b="0" i="1" smtClean="0">
+                                        <a:solidFill>
+                                          <a:schemeClr val="tx1"/>
+                                        </a:solidFill>
+                                        <a:latin typeface="Cambria Math" panose="02040503050406030204" pitchFamily="18" charset="0"/>
+                                      </a:rPr>
+                                      <m:t>9</m:t>
+                                    </m:r>
+                                  </m:sub>
+                                </m:sSub>
+                              </m:oMath>
+                            </m:oMathPara>
+                          </a14:m>
+                          <a:endParaRPr lang="en-US" dirty="0">
+                            <a:solidFill>
+                              <a:schemeClr val="tx1"/>
+                            </a:solidFill>
+                          </a:endParaRPr>
+                        </a:p>
+                      </a:txBody>
+                      <a:tcPr>
+                        <a:solidFill>
+                          <a:schemeClr val="accent1"/>
+                        </a:solidFill>
+                      </a:tcPr>
+                    </a:tc>
+                    <a:tc>
+                      <a:txBody>
+                        <a:bodyPr/>
+                        <a:lstStyle/>
+                        <a:p>
+                          <a:pPr algn="r"/>
+                          <a:r>
+                            <a:rPr lang="en-US" dirty="0"/>
+                            <a:t>0.001</a:t>
+                          </a:r>
+                        </a:p>
+                      </a:txBody>
+                      <a:tcPr/>
+                    </a:tc>
+                    <a:tc>
+                      <a:txBody>
+                        <a:bodyPr/>
+                        <a:lstStyle/>
+                        <a:p>
+                          <a:pPr algn="r"/>
+                          <a:r>
+                            <a:rPr lang="en-US" dirty="0"/>
+                            <a:t>0.001</a:t>
+                          </a:r>
+                        </a:p>
+                      </a:txBody>
+                      <a:tcPr/>
+                    </a:tc>
+                    <a:tc>
+                      <a:txBody>
+                        <a:bodyPr/>
+                        <a:lstStyle/>
+                        <a:p>
+                          <a:pPr algn="r"/>
+                          <a:r>
+                            <a:rPr lang="en-US" dirty="0"/>
+                            <a:t>7701</a:t>
+                          </a:r>
+                        </a:p>
+                      </a:txBody>
+                      <a:tcPr/>
+                    </a:tc>
+                    <a:tc>
+                      <a:txBody>
+                        <a:bodyPr/>
+                        <a:lstStyle/>
+                        <a:p>
+                          <a:pPr algn="r"/>
+                          <a:r>
+                            <a:rPr lang="en-US" dirty="0"/>
+                            <a:t>43888</a:t>
+                          </a:r>
+                        </a:p>
+                      </a:txBody>
+                      <a:tcPr/>
+                    </a:tc>
+                    <a:tc>
+                      <a:txBody>
+                        <a:bodyPr/>
+                        <a:lstStyle/>
+                        <a:p>
+                          <a:pPr algn="r"/>
+                          <a:r>
+                            <a:rPr lang="en-US" dirty="0"/>
+                            <a:t>1.52</a:t>
+                          </a:r>
+                        </a:p>
+                      </a:txBody>
+                      <a:tcPr/>
+                    </a:tc>
+                    <a:tc>
+                      <a:txBody>
+                        <a:bodyPr/>
+                        <a:lstStyle/>
+                        <a:p>
+                          <a:pPr algn="r"/>
+                          <a:r>
+                            <a:rPr lang="en-US" dirty="0"/>
+                            <a:t>1</a:t>
+                          </a:r>
+                        </a:p>
+                      </a:txBody>
+                      <a:tcPr/>
+                    </a:tc>
+                    <a:extLst>
+                      <a:ext uri="{0D108BD9-81ED-4DB2-BD59-A6C34878D82A}">
+                        <a16:rowId xmlns:a16="http://schemas.microsoft.com/office/drawing/2014/main" val="2285340432"/>
+                      </a:ext>
+                    </a:extLst>
+                  </a:tr>
+                  <a:tr h="370840">
+                    <a:tc>
+                      <a:txBody>
+                        <a:bodyPr/>
+                        <a:lstStyle/>
+                        <a:p>
+                          <a:pPr/>
+                          <a14:m>
+                            <m:oMathPara xmlns:m="http://schemas.openxmlformats.org/officeDocument/2006/math">
+                              <m:oMathParaPr>
+                                <m:jc m:val="centerGroup"/>
+                              </m:oMathParaPr>
+                              <m:oMath xmlns:m="http://schemas.openxmlformats.org/officeDocument/2006/math">
+                                <m:sSub>
+                                  <m:sSubPr>
+                                    <m:ctrlPr>
+                                      <a:rPr lang="en-US" b="0" i="1" smtClean="0">
+                                        <a:solidFill>
+                                          <a:schemeClr val="tx1"/>
+                                        </a:solidFill>
+                                        <a:latin typeface="Cambria Math" panose="02040503050406030204" pitchFamily="18" charset="0"/>
+                                      </a:rPr>
+                                    </m:ctrlPr>
+                                  </m:sSubPr>
+                                  <m:e>
+                                    <m:r>
+                                      <a:rPr lang="en-US" b="0" i="1" smtClean="0">
+                                        <a:solidFill>
+                                          <a:schemeClr val="tx1"/>
+                                        </a:solidFill>
+                                        <a:latin typeface="Cambria Math" panose="02040503050406030204" pitchFamily="18" charset="0"/>
+                                      </a:rPr>
+                                      <m:t>𝛽</m:t>
+                                    </m:r>
+                                  </m:e>
+                                  <m:sub>
+                                    <m:r>
+                                      <a:rPr lang="en-US" b="0" i="1" smtClean="0">
+                                        <a:solidFill>
+                                          <a:schemeClr val="tx1"/>
+                                        </a:solidFill>
+                                        <a:latin typeface="Cambria Math" panose="02040503050406030204" pitchFamily="18" charset="0"/>
+                                      </a:rPr>
+                                      <m:t>10</m:t>
+                                    </m:r>
+                                  </m:sub>
+                                </m:sSub>
+                              </m:oMath>
+                            </m:oMathPara>
+                          </a14:m>
+                          <a:endParaRPr lang="en-US" dirty="0">
+                            <a:solidFill>
+                              <a:schemeClr val="tx1"/>
+                            </a:solidFill>
+                          </a:endParaRPr>
+                        </a:p>
+                      </a:txBody>
+                      <a:tcPr>
+                        <a:solidFill>
+                          <a:schemeClr val="accent1"/>
+                        </a:solidFill>
+                      </a:tcPr>
+                    </a:tc>
+                    <a:tc>
+                      <a:txBody>
+                        <a:bodyPr/>
+                        <a:lstStyle/>
+                        <a:p>
+                          <a:pPr algn="r"/>
+                          <a:r>
+                            <a:rPr lang="en-US" dirty="0"/>
+                            <a:t>0.084</a:t>
+                          </a:r>
+                        </a:p>
+                      </a:txBody>
+                      <a:tcPr/>
+                    </a:tc>
+                    <a:tc>
+                      <a:txBody>
+                        <a:bodyPr/>
+                        <a:lstStyle/>
+                        <a:p>
+                          <a:pPr algn="r"/>
+                          <a:r>
+                            <a:rPr lang="en-US" dirty="0"/>
+                            <a:t>0.084</a:t>
+                          </a:r>
+                        </a:p>
+                      </a:txBody>
+                      <a:tcPr/>
+                    </a:tc>
+                    <a:tc>
+                      <a:txBody>
+                        <a:bodyPr/>
+                        <a:lstStyle/>
+                        <a:p>
+                          <a:pPr algn="r"/>
+                          <a:r>
+                            <a:rPr lang="en-US" dirty="0"/>
+                            <a:t>9000</a:t>
+                          </a:r>
+                        </a:p>
+                      </a:txBody>
+                      <a:tcPr/>
+                    </a:tc>
+                    <a:tc>
+                      <a:txBody>
+                        <a:bodyPr/>
+                        <a:lstStyle/>
+                        <a:p>
+                          <a:pPr algn="r"/>
+                          <a:r>
+                            <a:rPr lang="en-US" dirty="0"/>
+                            <a:t>65405</a:t>
+                          </a:r>
+                        </a:p>
+                      </a:txBody>
+                      <a:tcPr/>
+                    </a:tc>
+                    <a:tc>
+                      <a:txBody>
+                        <a:bodyPr/>
+                        <a:lstStyle/>
+                        <a:p>
+                          <a:pPr algn="r"/>
+                          <a:r>
+                            <a:rPr lang="en-US" dirty="0"/>
+                            <a:t>1.52</a:t>
+                          </a:r>
+                        </a:p>
+                      </a:txBody>
+                      <a:tcPr/>
+                    </a:tc>
+                    <a:tc>
+                      <a:txBody>
+                        <a:bodyPr/>
+                        <a:lstStyle/>
+                        <a:p>
+                          <a:pPr algn="r"/>
+                          <a:r>
+                            <a:rPr lang="en-US" dirty="0"/>
+                            <a:t>1</a:t>
+                          </a:r>
+                        </a:p>
+                      </a:txBody>
+                      <a:tcPr/>
+                    </a:tc>
+                    <a:extLst>
+                      <a:ext uri="{0D108BD9-81ED-4DB2-BD59-A6C34878D82A}">
+                        <a16:rowId xmlns:a16="http://schemas.microsoft.com/office/drawing/2014/main" val="508397299"/>
+                      </a:ext>
+                    </a:extLst>
+                  </a:tr>
+                </a:tbl>
+              </a:graphicData>
+            </a:graphic>
+          </p:graphicFrame>
+        </mc:Choice>
+        <mc:Fallback xmlns="">
+          <p:graphicFrame>
+            <p:nvGraphicFramePr>
+              <p:cNvPr id="4" name="Table 4">
+                <a:extLst>
+                  <a:ext uri="{FF2B5EF4-FFF2-40B4-BE49-F238E27FC236}">
+                    <a16:creationId xmlns:a16="http://schemas.microsoft.com/office/drawing/2014/main" id="{6F6E2AE0-5CC4-4129-BD47-3C98D4DBC6AC}"/>
+                  </a:ext>
+                </a:extLst>
+              </p:cNvPr>
+              <p:cNvGraphicFramePr>
+                <a:graphicFrameLocks noGrp="1"/>
+              </p:cNvGraphicFramePr>
+              <p:nvPr>
+                <p:ph idx="1"/>
+                <p:extLst>
+                  <p:ext uri="{D42A27DB-BD31-4B8C-83A1-F6EECF244321}">
+                    <p14:modId xmlns:p14="http://schemas.microsoft.com/office/powerpoint/2010/main" val="1680417465"/>
+                  </p:ext>
+                </p:extLst>
+              </p:nvPr>
+            </p:nvGraphicFramePr>
+            <p:xfrm>
+              <a:off x="1120775" y="1825625"/>
+              <a:ext cx="10233020" cy="4450080"/>
+            </p:xfrm>
+            <a:graphic>
+              <a:graphicData uri="http://schemas.openxmlformats.org/drawingml/2006/table">
+                <a:tbl>
+                  <a:tblPr firstRow="1" bandRow="1">
+                    <a:tableStyleId>{5C22544A-7EE6-4342-B048-85BDC9FD1C3A}</a:tableStyleId>
+                  </a:tblPr>
+                  <a:tblGrid>
+                    <a:gridCol w="1461860">
+                      <a:extLst>
+                        <a:ext uri="{9D8B030D-6E8A-4147-A177-3AD203B41FA5}">
+                          <a16:colId xmlns:a16="http://schemas.microsoft.com/office/drawing/2014/main" val="3179748796"/>
+                        </a:ext>
+                      </a:extLst>
+                    </a:gridCol>
+                    <a:gridCol w="1461860">
+                      <a:extLst>
+                        <a:ext uri="{9D8B030D-6E8A-4147-A177-3AD203B41FA5}">
+                          <a16:colId xmlns:a16="http://schemas.microsoft.com/office/drawing/2014/main" val="1982583210"/>
+                        </a:ext>
+                      </a:extLst>
+                    </a:gridCol>
+                    <a:gridCol w="1461860">
+                      <a:extLst>
+                        <a:ext uri="{9D8B030D-6E8A-4147-A177-3AD203B41FA5}">
+                          <a16:colId xmlns:a16="http://schemas.microsoft.com/office/drawing/2014/main" val="3345827443"/>
+                        </a:ext>
+                      </a:extLst>
+                    </a:gridCol>
+                    <a:gridCol w="1461860">
+                      <a:extLst>
+                        <a:ext uri="{9D8B030D-6E8A-4147-A177-3AD203B41FA5}">
+                          <a16:colId xmlns:a16="http://schemas.microsoft.com/office/drawing/2014/main" val="3221203264"/>
+                        </a:ext>
+                      </a:extLst>
+                    </a:gridCol>
+                    <a:gridCol w="1461860">
+                      <a:extLst>
+                        <a:ext uri="{9D8B030D-6E8A-4147-A177-3AD203B41FA5}">
+                          <a16:colId xmlns:a16="http://schemas.microsoft.com/office/drawing/2014/main" val="502688713"/>
+                        </a:ext>
+                      </a:extLst>
+                    </a:gridCol>
+                    <a:gridCol w="1461860">
+                      <a:extLst>
+                        <a:ext uri="{9D8B030D-6E8A-4147-A177-3AD203B41FA5}">
+                          <a16:colId xmlns:a16="http://schemas.microsoft.com/office/drawing/2014/main" val="2219946809"/>
+                        </a:ext>
+                      </a:extLst>
+                    </a:gridCol>
+                    <a:gridCol w="1461860">
+                      <a:extLst>
+                        <a:ext uri="{9D8B030D-6E8A-4147-A177-3AD203B41FA5}">
+                          <a16:colId xmlns:a16="http://schemas.microsoft.com/office/drawing/2014/main" val="2459791304"/>
+                        </a:ext>
+                      </a:extLst>
+                    </a:gridCol>
+                  </a:tblGrid>
+                  <a:tr h="370840">
+                    <a:tc>
+                      <a:txBody>
+                        <a:bodyPr/>
+                        <a:lstStyle/>
+                        <a:p>
+                          <a:endParaRPr lang="en-US" dirty="0"/>
+                        </a:p>
+                      </a:txBody>
+                      <a:tcPr>
+                        <a:solidFill>
+                          <a:schemeClr val="accent1"/>
+                        </a:solidFill>
+                      </a:tcPr>
+                    </a:tc>
+                    <a:tc gridSpan="2">
+                      <a:txBody>
+                        <a:bodyPr/>
+                        <a:lstStyle/>
+                        <a:p>
+                          <a:pPr algn="ctr"/>
+                          <a:r>
+                            <a:rPr lang="en-US" dirty="0"/>
+                            <a:t>Estimate</a:t>
+                          </a:r>
+                        </a:p>
+                      </a:txBody>
+                      <a:tcPr>
+                        <a:solidFill>
+                          <a:schemeClr val="accent1"/>
+                        </a:solidFill>
+                      </a:tcPr>
+                    </a:tc>
+                    <a:tc hMerge="1">
+                      <a:txBody>
+                        <a:bodyPr/>
+                        <a:lstStyle/>
+                        <a:p>
+                          <a:endParaRPr lang="en-US" dirty="0"/>
+                        </a:p>
+                      </a:txBody>
+                      <a:tcPr>
+                        <a:solidFill>
+                          <a:schemeClr val="accent1"/>
+                        </a:solidFill>
+                      </a:tcPr>
+                    </a:tc>
+                    <a:tc gridSpan="2">
+                      <a:txBody>
+                        <a:bodyPr/>
+                        <a:lstStyle/>
+                        <a:p>
+                          <a:pPr algn="ctr"/>
+                          <a:r>
+                            <a:rPr lang="en-US" dirty="0"/>
+                            <a:t>ESS</a:t>
+                          </a:r>
+                        </a:p>
+                      </a:txBody>
+                      <a:tcPr>
+                        <a:solidFill>
+                          <a:schemeClr val="accent1"/>
+                        </a:solidFill>
+                      </a:tcPr>
+                    </a:tc>
+                    <a:tc hMerge="1">
+                      <a:txBody>
+                        <a:bodyPr/>
+                        <a:lstStyle/>
+                        <a:p>
+                          <a:endParaRPr lang="en-US" dirty="0"/>
+                        </a:p>
+                      </a:txBody>
+                      <a:tcPr>
+                        <a:solidFill>
+                          <a:schemeClr val="accent1"/>
+                        </a:solidFill>
+                      </a:tcPr>
+                    </a:tc>
+                    <a:tc gridSpan="2">
+                      <a:txBody>
+                        <a:bodyPr/>
+                        <a:lstStyle/>
+                        <a:p>
+                          <a:pPr algn="ctr"/>
+                          <a:r>
+                            <a:rPr lang="en-US" dirty="0" err="1"/>
+                            <a:t>Rhat</a:t>
+                          </a:r>
+                          <a:endParaRPr lang="en-US" dirty="0"/>
+                        </a:p>
+                      </a:txBody>
+                      <a:tcPr>
+                        <a:solidFill>
+                          <a:schemeClr val="accent1"/>
+                        </a:solidFill>
+                      </a:tcPr>
+                    </a:tc>
+                    <a:tc hMerge="1">
+                      <a:txBody>
+                        <a:bodyPr/>
+                        <a:lstStyle/>
+                        <a:p>
+                          <a:endParaRPr lang="en-US" dirty="0"/>
+                        </a:p>
+                      </a:txBody>
+                      <a:tcPr>
+                        <a:solidFill>
+                          <a:schemeClr val="accent1"/>
+                        </a:solidFill>
+                      </a:tcPr>
+                    </a:tc>
+                    <a:extLst>
+                      <a:ext uri="{0D108BD9-81ED-4DB2-BD59-A6C34878D82A}">
+                        <a16:rowId xmlns:a16="http://schemas.microsoft.com/office/drawing/2014/main" val="2456736051"/>
+                      </a:ext>
+                    </a:extLst>
+                  </a:tr>
+                  <a:tr h="370840">
+                    <a:tc>
+                      <a:txBody>
+                        <a:bodyPr/>
+                        <a:lstStyle/>
+                        <a:p>
+                          <a:endParaRPr lang="en-US" dirty="0"/>
+                        </a:p>
+                      </a:txBody>
+                      <a:tcPr>
+                        <a:solidFill>
+                          <a:schemeClr val="accent1"/>
+                        </a:solidFill>
+                      </a:tcPr>
+                    </a:tc>
+                    <a:tc>
+                      <a:txBody>
+                        <a:bodyPr/>
+                        <a:lstStyle/>
+                        <a:p>
+                          <a:pPr algn="ctr"/>
+                          <a:r>
+                            <a:rPr lang="en-US" dirty="0"/>
+                            <a:t>Slice Sampler</a:t>
+                          </a:r>
+                        </a:p>
+                      </a:txBody>
+                      <a:tcPr>
+                        <a:solidFill>
+                          <a:schemeClr val="accent1"/>
+                        </a:solidFill>
+                      </a:tcPr>
+                    </a:tc>
+                    <a:tc>
+                      <a:txBody>
+                        <a:bodyPr/>
+                        <a:lstStyle/>
+                        <a:p>
+                          <a:pPr algn="ctr"/>
+                          <a:r>
+                            <a:rPr lang="en-US" dirty="0"/>
+                            <a:t>Stan</a:t>
+                          </a:r>
+                        </a:p>
+                      </a:txBody>
+                      <a:tcPr>
+                        <a:solidFill>
+                          <a:schemeClr val="accent1"/>
+                        </a:solidFill>
+                      </a:tcPr>
+                    </a:tc>
+                    <a:tc>
+                      <a:txBody>
+                        <a:bodyPr/>
+                        <a:lstStyle/>
+                        <a:p>
+                          <a:pPr algn="ctr"/>
+                          <a:r>
+                            <a:rPr lang="en-US" dirty="0"/>
+                            <a:t>Slice Sampler</a:t>
+                          </a:r>
+                        </a:p>
+                      </a:txBody>
+                      <a:tcPr>
+                        <a:solidFill>
+                          <a:schemeClr val="accent1"/>
+                        </a:solidFill>
+                      </a:tcPr>
+                    </a:tc>
+                    <a:tc>
+                      <a:txBody>
+                        <a:bodyPr/>
+                        <a:lstStyle/>
+                        <a:p>
+                          <a:pPr algn="ctr"/>
+                          <a:r>
+                            <a:rPr lang="en-US" dirty="0"/>
+                            <a:t>Stan</a:t>
+                          </a:r>
+                        </a:p>
+                      </a:txBody>
+                      <a:tcPr>
+                        <a:solidFill>
+                          <a:schemeClr val="accent1"/>
+                        </a:solidFill>
+                      </a:tcPr>
+                    </a:tc>
+                    <a:tc>
+                      <a:txBody>
+                        <a:bodyPr/>
+                        <a:lstStyle/>
+                        <a:p>
+                          <a:pPr algn="ctr"/>
+                          <a:r>
+                            <a:rPr lang="en-US" dirty="0"/>
+                            <a:t>Slice Sampler</a:t>
+                          </a:r>
+                        </a:p>
+                      </a:txBody>
+                      <a:tcPr>
+                        <a:solidFill>
+                          <a:schemeClr val="accent1"/>
+                        </a:solidFill>
+                      </a:tcPr>
+                    </a:tc>
+                    <a:tc>
+                      <a:txBody>
+                        <a:bodyPr/>
+                        <a:lstStyle/>
+                        <a:p>
+                          <a:pPr algn="ctr"/>
+                          <a:r>
+                            <a:rPr lang="en-US" dirty="0"/>
+                            <a:t>Stan</a:t>
+                          </a:r>
+                        </a:p>
+                      </a:txBody>
+                      <a:tcPr>
+                        <a:solidFill>
+                          <a:schemeClr val="accent1"/>
+                        </a:solidFill>
+                      </a:tcPr>
+                    </a:tc>
+                    <a:extLst>
+                      <a:ext uri="{0D108BD9-81ED-4DB2-BD59-A6C34878D82A}">
+                        <a16:rowId xmlns:a16="http://schemas.microsoft.com/office/drawing/2014/main" val="3931079199"/>
+                      </a:ext>
+                    </a:extLst>
+                  </a:tr>
+                  <a:tr h="370840">
+                    <a:tc>
+                      <a:txBody>
+                        <a:bodyPr/>
+                        <a:lstStyle/>
+                        <a:p>
+                          <a:endParaRPr lang="en-US"/>
+                        </a:p>
+                      </a:txBody>
+                      <a:tcPr>
+                        <a:blipFill>
+                          <a:blip r:embed="rId2"/>
+                          <a:stretch>
+                            <a:fillRect l="-417" t="-208197" r="-601667" b="-922951"/>
+                          </a:stretch>
+                        </a:blipFill>
+                      </a:tcPr>
+                    </a:tc>
+                    <a:tc>
+                      <a:txBody>
+                        <a:bodyPr/>
+                        <a:lstStyle/>
+                        <a:p>
+                          <a:pPr algn="r"/>
+                          <a:r>
+                            <a:rPr lang="en-US" dirty="0"/>
+                            <a:t>2.671</a:t>
+                          </a:r>
+                        </a:p>
+                      </a:txBody>
+                      <a:tcPr/>
+                    </a:tc>
+                    <a:tc>
+                      <a:txBody>
+                        <a:bodyPr/>
+                        <a:lstStyle/>
+                        <a:p>
+                          <a:pPr algn="r"/>
+                          <a:r>
+                            <a:rPr lang="en-US" dirty="0"/>
+                            <a:t>2.671</a:t>
+                          </a:r>
+                        </a:p>
+                      </a:txBody>
+                      <a:tcPr/>
+                    </a:tc>
+                    <a:tc>
+                      <a:txBody>
+                        <a:bodyPr/>
+                        <a:lstStyle/>
+                        <a:p>
+                          <a:pPr algn="r"/>
+                          <a:r>
+                            <a:rPr lang="en-US" dirty="0"/>
+                            <a:t>2252</a:t>
+                          </a:r>
+                        </a:p>
+                      </a:txBody>
+                      <a:tcPr/>
+                    </a:tc>
+                    <a:tc>
+                      <a:txBody>
+                        <a:bodyPr/>
+                        <a:lstStyle/>
+                        <a:p>
+                          <a:pPr algn="r"/>
+                          <a:r>
+                            <a:rPr lang="en-US" dirty="0"/>
+                            <a:t>21441</a:t>
+                          </a:r>
+                        </a:p>
+                      </a:txBody>
+                      <a:tcPr/>
+                    </a:tc>
+                    <a:tc>
+                      <a:txBody>
+                        <a:bodyPr/>
+                        <a:lstStyle/>
+                        <a:p>
+                          <a:pPr algn="r"/>
+                          <a:r>
+                            <a:rPr lang="en-US" dirty="0"/>
+                            <a:t>1.52</a:t>
+                          </a:r>
+                        </a:p>
+                      </a:txBody>
+                      <a:tcPr/>
+                    </a:tc>
+                    <a:tc>
+                      <a:txBody>
+                        <a:bodyPr/>
+                        <a:lstStyle/>
+                        <a:p>
+                          <a:pPr algn="r"/>
+                          <a:r>
+                            <a:rPr lang="en-US" dirty="0"/>
+                            <a:t>1</a:t>
+                          </a:r>
+                        </a:p>
+                      </a:txBody>
+                      <a:tcPr/>
+                    </a:tc>
+                    <a:extLst>
+                      <a:ext uri="{0D108BD9-81ED-4DB2-BD59-A6C34878D82A}">
+                        <a16:rowId xmlns:a16="http://schemas.microsoft.com/office/drawing/2014/main" val="3612399380"/>
+                      </a:ext>
+                    </a:extLst>
+                  </a:tr>
+                  <a:tr h="370840">
+                    <a:tc>
+                      <a:txBody>
+                        <a:bodyPr/>
+                        <a:lstStyle/>
+                        <a:p>
+                          <a:endParaRPr lang="en-US"/>
+                        </a:p>
+                      </a:txBody>
+                      <a:tcPr>
+                        <a:blipFill>
+                          <a:blip r:embed="rId2"/>
+                          <a:stretch>
+                            <a:fillRect l="-417" t="-308197" r="-601667" b="-822951"/>
+                          </a:stretch>
+                        </a:blipFill>
+                      </a:tcPr>
+                    </a:tc>
+                    <a:tc>
+                      <a:txBody>
+                        <a:bodyPr/>
+                        <a:lstStyle/>
+                        <a:p>
+                          <a:pPr algn="r"/>
+                          <a:r>
+                            <a:rPr lang="en-US" dirty="0"/>
+                            <a:t>-0.013</a:t>
+                          </a:r>
+                        </a:p>
+                      </a:txBody>
+                      <a:tcPr/>
+                    </a:tc>
+                    <a:tc>
+                      <a:txBody>
+                        <a:bodyPr/>
+                        <a:lstStyle/>
+                        <a:p>
+                          <a:pPr algn="r"/>
+                          <a:r>
+                            <a:rPr lang="en-US" dirty="0"/>
+                            <a:t>-0.013</a:t>
+                          </a:r>
+                        </a:p>
+                      </a:txBody>
+                      <a:tcPr/>
+                    </a:tc>
+                    <a:tc>
+                      <a:txBody>
+                        <a:bodyPr/>
+                        <a:lstStyle/>
+                        <a:p>
+                          <a:pPr algn="r"/>
+                          <a:r>
+                            <a:rPr lang="en-US" dirty="0"/>
+                            <a:t>2757</a:t>
+                          </a:r>
+                        </a:p>
+                      </a:txBody>
+                      <a:tcPr/>
+                    </a:tc>
+                    <a:tc>
+                      <a:txBody>
+                        <a:bodyPr/>
+                        <a:lstStyle/>
+                        <a:p>
+                          <a:pPr algn="r"/>
+                          <a:r>
+                            <a:rPr lang="en-US" dirty="0"/>
+                            <a:t>25318</a:t>
+                          </a:r>
+                        </a:p>
+                      </a:txBody>
+                      <a:tcPr/>
+                    </a:tc>
+                    <a:tc>
+                      <a:txBody>
+                        <a:bodyPr/>
+                        <a:lstStyle/>
+                        <a:p>
+                          <a:pPr algn="r"/>
+                          <a:r>
+                            <a:rPr lang="en-US" dirty="0"/>
+                            <a:t>1.33</a:t>
+                          </a:r>
+                        </a:p>
+                      </a:txBody>
+                      <a:tcPr/>
+                    </a:tc>
+                    <a:tc>
+                      <a:txBody>
+                        <a:bodyPr/>
+                        <a:lstStyle/>
+                        <a:p>
+                          <a:pPr algn="r"/>
+                          <a:r>
+                            <a:rPr lang="en-US" dirty="0"/>
+                            <a:t>1</a:t>
+                          </a:r>
+                        </a:p>
+                      </a:txBody>
+                      <a:tcPr/>
+                    </a:tc>
+                    <a:extLst>
+                      <a:ext uri="{0D108BD9-81ED-4DB2-BD59-A6C34878D82A}">
+                        <a16:rowId xmlns:a16="http://schemas.microsoft.com/office/drawing/2014/main" val="1115967027"/>
+                      </a:ext>
+                    </a:extLst>
+                  </a:tr>
+                  <a:tr h="370840">
+                    <a:tc>
+                      <a:txBody>
+                        <a:bodyPr/>
+                        <a:lstStyle/>
+                        <a:p>
+                          <a:endParaRPr lang="en-US"/>
+                        </a:p>
+                      </a:txBody>
+                      <a:tcPr>
+                        <a:blipFill>
+                          <a:blip r:embed="rId2"/>
+                          <a:stretch>
+                            <a:fillRect l="-417" t="-408197" r="-601667" b="-722951"/>
+                          </a:stretch>
+                        </a:blipFill>
+                      </a:tcPr>
+                    </a:tc>
+                    <a:tc>
+                      <a:txBody>
+                        <a:bodyPr/>
+                        <a:lstStyle/>
+                        <a:p>
+                          <a:pPr algn="r"/>
+                          <a:r>
+                            <a:rPr lang="en-US" dirty="0"/>
+                            <a:t>0.108</a:t>
+                          </a:r>
+                        </a:p>
+                      </a:txBody>
+                      <a:tcPr/>
+                    </a:tc>
+                    <a:tc>
+                      <a:txBody>
+                        <a:bodyPr/>
+                        <a:lstStyle/>
+                        <a:p>
+                          <a:pPr algn="r"/>
+                          <a:r>
+                            <a:rPr lang="en-US" dirty="0"/>
+                            <a:t>0.107</a:t>
+                          </a:r>
+                        </a:p>
+                      </a:txBody>
+                      <a:tcPr/>
+                    </a:tc>
+                    <a:tc>
+                      <a:txBody>
+                        <a:bodyPr/>
+                        <a:lstStyle/>
+                        <a:p>
+                          <a:pPr algn="r"/>
+                          <a:r>
+                            <a:rPr lang="en-US" dirty="0"/>
+                            <a:t>4714</a:t>
+                          </a:r>
+                        </a:p>
+                      </a:txBody>
+                      <a:tcPr/>
+                    </a:tc>
+                    <a:tc>
+                      <a:txBody>
+                        <a:bodyPr/>
+                        <a:lstStyle/>
+                        <a:p>
+                          <a:pPr algn="r"/>
+                          <a:r>
+                            <a:rPr lang="en-US" dirty="0"/>
+                            <a:t>35126</a:t>
+                          </a:r>
+                        </a:p>
+                      </a:txBody>
+                      <a:tcPr/>
+                    </a:tc>
+                    <a:tc>
+                      <a:txBody>
+                        <a:bodyPr/>
+                        <a:lstStyle/>
+                        <a:p>
+                          <a:pPr algn="r"/>
+                          <a:r>
+                            <a:rPr lang="en-US" dirty="0"/>
+                            <a:t>1.48</a:t>
+                          </a:r>
+                        </a:p>
+                      </a:txBody>
+                      <a:tcPr/>
+                    </a:tc>
+                    <a:tc>
+                      <a:txBody>
+                        <a:bodyPr/>
+                        <a:lstStyle/>
+                        <a:p>
+                          <a:pPr algn="r"/>
+                          <a:r>
+                            <a:rPr lang="en-US" dirty="0"/>
+                            <a:t>1</a:t>
+                          </a:r>
+                        </a:p>
+                      </a:txBody>
+                      <a:tcPr/>
+                    </a:tc>
+                    <a:extLst>
+                      <a:ext uri="{0D108BD9-81ED-4DB2-BD59-A6C34878D82A}">
+                        <a16:rowId xmlns:a16="http://schemas.microsoft.com/office/drawing/2014/main" val="3276162553"/>
+                      </a:ext>
+                    </a:extLst>
+                  </a:tr>
+                  <a:tr h="370840">
+                    <a:tc>
+                      <a:txBody>
+                        <a:bodyPr/>
+                        <a:lstStyle/>
+                        <a:p>
+                          <a:endParaRPr lang="en-US"/>
+                        </a:p>
+                      </a:txBody>
+                      <a:tcPr>
+                        <a:blipFill>
+                          <a:blip r:embed="rId2"/>
+                          <a:stretch>
+                            <a:fillRect l="-417" t="-508197" r="-601667" b="-622951"/>
+                          </a:stretch>
+                        </a:blipFill>
+                      </a:tcPr>
+                    </a:tc>
+                    <a:tc>
+                      <a:txBody>
+                        <a:bodyPr/>
+                        <a:lstStyle/>
+                        <a:p>
+                          <a:pPr algn="r"/>
+                          <a:r>
+                            <a:rPr lang="en-US" dirty="0"/>
+                            <a:t>0.062</a:t>
+                          </a:r>
+                        </a:p>
+                      </a:txBody>
+                      <a:tcPr/>
+                    </a:tc>
+                    <a:tc>
+                      <a:txBody>
+                        <a:bodyPr/>
+                        <a:lstStyle/>
+                        <a:p>
+                          <a:pPr algn="r"/>
+                          <a:r>
+                            <a:rPr lang="en-US" dirty="0"/>
+                            <a:t>0.062</a:t>
+                          </a:r>
+                        </a:p>
+                      </a:txBody>
+                      <a:tcPr/>
+                    </a:tc>
+                    <a:tc>
+                      <a:txBody>
+                        <a:bodyPr/>
+                        <a:lstStyle/>
+                        <a:p>
+                          <a:pPr algn="r"/>
+                          <a:r>
+                            <a:rPr lang="en-US" dirty="0"/>
+                            <a:t>2695</a:t>
+                          </a:r>
+                        </a:p>
+                      </a:txBody>
+                      <a:tcPr/>
+                    </a:tc>
+                    <a:tc>
+                      <a:txBody>
+                        <a:bodyPr/>
+                        <a:lstStyle/>
+                        <a:p>
+                          <a:pPr algn="r"/>
+                          <a:r>
+                            <a:rPr lang="en-US" dirty="0"/>
+                            <a:t>25432</a:t>
+                          </a:r>
+                        </a:p>
+                      </a:txBody>
+                      <a:tcPr/>
+                    </a:tc>
+                    <a:tc>
+                      <a:txBody>
+                        <a:bodyPr/>
+                        <a:lstStyle/>
+                        <a:p>
+                          <a:pPr algn="r"/>
+                          <a:r>
+                            <a:rPr lang="en-US" dirty="0"/>
+                            <a:t>1.47</a:t>
+                          </a:r>
+                        </a:p>
+                      </a:txBody>
+                      <a:tcPr/>
+                    </a:tc>
+                    <a:tc>
+                      <a:txBody>
+                        <a:bodyPr/>
+                        <a:lstStyle/>
+                        <a:p>
+                          <a:pPr algn="r"/>
+                          <a:r>
+                            <a:rPr lang="en-US" dirty="0"/>
+                            <a:t>1</a:t>
+                          </a:r>
+                        </a:p>
+                      </a:txBody>
+                      <a:tcPr/>
+                    </a:tc>
+                    <a:extLst>
+                      <a:ext uri="{0D108BD9-81ED-4DB2-BD59-A6C34878D82A}">
+                        <a16:rowId xmlns:a16="http://schemas.microsoft.com/office/drawing/2014/main" val="1343808930"/>
+                      </a:ext>
+                    </a:extLst>
+                  </a:tr>
+                  <a:tr h="370840">
+                    <a:tc>
+                      <a:txBody>
+                        <a:bodyPr/>
+                        <a:lstStyle/>
+                        <a:p>
+                          <a:endParaRPr lang="en-US"/>
+                        </a:p>
+                      </a:txBody>
+                      <a:tcPr>
+                        <a:blipFill>
+                          <a:blip r:embed="rId2"/>
+                          <a:stretch>
+                            <a:fillRect l="-417" t="-618333" r="-601667" b="-533333"/>
+                          </a:stretch>
+                        </a:blipFill>
+                      </a:tcPr>
+                    </a:tc>
+                    <a:tc>
+                      <a:txBody>
+                        <a:bodyPr/>
+                        <a:lstStyle/>
+                        <a:p>
+                          <a:pPr algn="r"/>
+                          <a:r>
+                            <a:rPr lang="en-US" dirty="0"/>
+                            <a:t>-0.149</a:t>
+                          </a:r>
+                        </a:p>
+                      </a:txBody>
+                      <a:tcPr/>
+                    </a:tc>
+                    <a:tc>
+                      <a:txBody>
+                        <a:bodyPr/>
+                        <a:lstStyle/>
+                        <a:p>
+                          <a:pPr algn="r"/>
+                          <a:r>
+                            <a:rPr lang="en-US" dirty="0"/>
+                            <a:t>-0.149</a:t>
+                          </a:r>
+                        </a:p>
+                      </a:txBody>
+                      <a:tcPr/>
+                    </a:tc>
+                    <a:tc>
+                      <a:txBody>
+                        <a:bodyPr/>
+                        <a:lstStyle/>
+                        <a:p>
+                          <a:pPr algn="r"/>
+                          <a:r>
+                            <a:rPr lang="en-US" dirty="0"/>
+                            <a:t>3133</a:t>
+                          </a:r>
+                        </a:p>
+                      </a:txBody>
+                      <a:tcPr/>
+                    </a:tc>
+                    <a:tc>
+                      <a:txBody>
+                        <a:bodyPr/>
+                        <a:lstStyle/>
+                        <a:p>
+                          <a:pPr algn="r"/>
+                          <a:r>
+                            <a:rPr lang="en-US" dirty="0"/>
+                            <a:t>28564</a:t>
+                          </a:r>
+                        </a:p>
+                      </a:txBody>
+                      <a:tcPr/>
+                    </a:tc>
+                    <a:tc>
+                      <a:txBody>
+                        <a:bodyPr/>
+                        <a:lstStyle/>
+                        <a:p>
+                          <a:pPr algn="r"/>
+                          <a:r>
+                            <a:rPr lang="en-US" dirty="0"/>
+                            <a:t>1.52</a:t>
+                          </a:r>
+                        </a:p>
+                      </a:txBody>
+                      <a:tcPr/>
+                    </a:tc>
+                    <a:tc>
+                      <a:txBody>
+                        <a:bodyPr/>
+                        <a:lstStyle/>
+                        <a:p>
+                          <a:pPr algn="r"/>
+                          <a:r>
+                            <a:rPr lang="en-US" dirty="0"/>
+                            <a:t>1</a:t>
+                          </a:r>
+                        </a:p>
+                      </a:txBody>
+                      <a:tcPr/>
+                    </a:tc>
+                    <a:extLst>
+                      <a:ext uri="{0D108BD9-81ED-4DB2-BD59-A6C34878D82A}">
+                        <a16:rowId xmlns:a16="http://schemas.microsoft.com/office/drawing/2014/main" val="2480711303"/>
+                      </a:ext>
+                    </a:extLst>
+                  </a:tr>
+                  <a:tr h="370840">
+                    <a:tc>
+                      <a:txBody>
+                        <a:bodyPr/>
+                        <a:lstStyle/>
+                        <a:p>
+                          <a:endParaRPr lang="en-US"/>
+                        </a:p>
+                      </a:txBody>
+                      <a:tcPr>
+                        <a:blipFill>
+                          <a:blip r:embed="rId2"/>
+                          <a:stretch>
+                            <a:fillRect l="-417" t="-706557" r="-601667" b="-424590"/>
+                          </a:stretch>
+                        </a:blipFill>
+                      </a:tcPr>
+                    </a:tc>
+                    <a:tc>
+                      <a:txBody>
+                        <a:bodyPr/>
+                        <a:lstStyle/>
+                        <a:p>
+                          <a:pPr algn="r"/>
+                          <a:r>
+                            <a:rPr lang="en-US" dirty="0"/>
+                            <a:t>0.731</a:t>
+                          </a:r>
+                        </a:p>
+                      </a:txBody>
+                      <a:tcPr/>
+                    </a:tc>
+                    <a:tc>
+                      <a:txBody>
+                        <a:bodyPr/>
+                        <a:lstStyle/>
+                        <a:p>
+                          <a:pPr algn="r"/>
+                          <a:r>
+                            <a:rPr lang="en-US" dirty="0"/>
+                            <a:t>0.731</a:t>
+                          </a:r>
+                        </a:p>
+                      </a:txBody>
+                      <a:tcPr/>
+                    </a:tc>
+                    <a:tc>
+                      <a:txBody>
+                        <a:bodyPr/>
+                        <a:lstStyle/>
+                        <a:p>
+                          <a:pPr algn="r"/>
+                          <a:r>
+                            <a:rPr lang="en-US" dirty="0"/>
+                            <a:t>7986</a:t>
+                          </a:r>
+                        </a:p>
+                      </a:txBody>
+                      <a:tcPr/>
+                    </a:tc>
+                    <a:tc>
+                      <a:txBody>
+                        <a:bodyPr/>
+                        <a:lstStyle/>
+                        <a:p>
+                          <a:pPr algn="r"/>
+                          <a:r>
+                            <a:rPr lang="en-US" dirty="0"/>
+                            <a:t>45810</a:t>
+                          </a:r>
+                        </a:p>
+                      </a:txBody>
+                      <a:tcPr/>
+                    </a:tc>
+                    <a:tc>
+                      <a:txBody>
+                        <a:bodyPr/>
+                        <a:lstStyle/>
+                        <a:p>
+                          <a:pPr algn="r"/>
+                          <a:r>
+                            <a:rPr lang="en-US" dirty="0"/>
+                            <a:t>1.52</a:t>
+                          </a:r>
+                        </a:p>
+                      </a:txBody>
+                      <a:tcPr/>
+                    </a:tc>
+                    <a:tc>
+                      <a:txBody>
+                        <a:bodyPr/>
+                        <a:lstStyle/>
+                        <a:p>
+                          <a:pPr algn="r"/>
+                          <a:r>
+                            <a:rPr lang="en-US" dirty="0"/>
+                            <a:t>1</a:t>
+                          </a:r>
+                        </a:p>
+                      </a:txBody>
+                      <a:tcPr/>
+                    </a:tc>
+                    <a:extLst>
+                      <a:ext uri="{0D108BD9-81ED-4DB2-BD59-A6C34878D82A}">
+                        <a16:rowId xmlns:a16="http://schemas.microsoft.com/office/drawing/2014/main" val="907850554"/>
+                      </a:ext>
+                    </a:extLst>
+                  </a:tr>
+                  <a:tr h="370840">
+                    <a:tc>
+                      <a:txBody>
+                        <a:bodyPr/>
+                        <a:lstStyle/>
+                        <a:p>
+                          <a:endParaRPr lang="en-US"/>
+                        </a:p>
+                      </a:txBody>
+                      <a:tcPr>
+                        <a:blipFill>
+                          <a:blip r:embed="rId2"/>
+                          <a:stretch>
+                            <a:fillRect l="-417" t="-806557" r="-601667" b="-324590"/>
+                          </a:stretch>
+                        </a:blipFill>
+                      </a:tcPr>
+                    </a:tc>
+                    <a:tc>
+                      <a:txBody>
+                        <a:bodyPr/>
+                        <a:lstStyle/>
+                        <a:p>
+                          <a:pPr algn="r"/>
+                          <a:r>
+                            <a:rPr lang="en-US" dirty="0"/>
+                            <a:t>-0.037</a:t>
+                          </a:r>
+                        </a:p>
+                      </a:txBody>
+                      <a:tcPr/>
+                    </a:tc>
+                    <a:tc>
+                      <a:txBody>
+                        <a:bodyPr/>
+                        <a:lstStyle/>
+                        <a:p>
+                          <a:pPr algn="r"/>
+                          <a:r>
+                            <a:rPr lang="en-US" dirty="0"/>
+                            <a:t>-0.036</a:t>
+                          </a:r>
+                        </a:p>
+                      </a:txBody>
+                      <a:tcPr/>
+                    </a:tc>
+                    <a:tc>
+                      <a:txBody>
+                        <a:bodyPr/>
+                        <a:lstStyle/>
+                        <a:p>
+                          <a:pPr algn="r"/>
+                          <a:r>
+                            <a:rPr lang="en-US" dirty="0"/>
+                            <a:t>3532</a:t>
+                          </a:r>
+                        </a:p>
+                      </a:txBody>
+                      <a:tcPr/>
+                    </a:tc>
+                    <a:tc>
+                      <a:txBody>
+                        <a:bodyPr/>
+                        <a:lstStyle/>
+                        <a:p>
+                          <a:pPr algn="r"/>
+                          <a:r>
+                            <a:rPr lang="en-US" dirty="0"/>
+                            <a:t>30704</a:t>
+                          </a:r>
+                        </a:p>
+                      </a:txBody>
+                      <a:tcPr/>
+                    </a:tc>
+                    <a:tc>
+                      <a:txBody>
+                        <a:bodyPr/>
+                        <a:lstStyle/>
+                        <a:p>
+                          <a:pPr algn="r"/>
+                          <a:r>
+                            <a:rPr lang="en-US" dirty="0"/>
+                            <a:t>1.13</a:t>
+                          </a:r>
+                        </a:p>
+                      </a:txBody>
+                      <a:tcPr/>
+                    </a:tc>
+                    <a:tc>
+                      <a:txBody>
+                        <a:bodyPr/>
+                        <a:lstStyle/>
+                        <a:p>
+                          <a:pPr algn="r"/>
+                          <a:r>
+                            <a:rPr lang="en-US" dirty="0"/>
+                            <a:t>1</a:t>
+                          </a:r>
+                        </a:p>
+                      </a:txBody>
+                      <a:tcPr/>
+                    </a:tc>
+                    <a:extLst>
+                      <a:ext uri="{0D108BD9-81ED-4DB2-BD59-A6C34878D82A}">
+                        <a16:rowId xmlns:a16="http://schemas.microsoft.com/office/drawing/2014/main" val="3785184036"/>
+                      </a:ext>
+                    </a:extLst>
+                  </a:tr>
+                  <a:tr h="370840">
+                    <a:tc>
+                      <a:txBody>
+                        <a:bodyPr/>
+                        <a:lstStyle/>
+                        <a:p>
+                          <a:endParaRPr lang="en-US"/>
+                        </a:p>
+                      </a:txBody>
+                      <a:tcPr>
+                        <a:blipFill>
+                          <a:blip r:embed="rId2"/>
+                          <a:stretch>
+                            <a:fillRect l="-417" t="-906557" r="-601667" b="-224590"/>
+                          </a:stretch>
+                        </a:blipFill>
+                      </a:tcPr>
+                    </a:tc>
+                    <a:tc>
+                      <a:txBody>
+                        <a:bodyPr/>
+                        <a:lstStyle/>
+                        <a:p>
+                          <a:pPr algn="r"/>
+                          <a:r>
+                            <a:rPr lang="en-US" dirty="0"/>
+                            <a:t>0.025</a:t>
+                          </a:r>
+                        </a:p>
+                      </a:txBody>
+                      <a:tcPr/>
+                    </a:tc>
+                    <a:tc>
+                      <a:txBody>
+                        <a:bodyPr/>
+                        <a:lstStyle/>
+                        <a:p>
+                          <a:pPr algn="r"/>
+                          <a:r>
+                            <a:rPr lang="en-US" dirty="0"/>
+                            <a:t>0.025</a:t>
+                          </a:r>
+                        </a:p>
+                      </a:txBody>
+                      <a:tcPr/>
+                    </a:tc>
+                    <a:tc>
+                      <a:txBody>
+                        <a:bodyPr/>
+                        <a:lstStyle/>
+                        <a:p>
+                          <a:pPr algn="r"/>
+                          <a:r>
+                            <a:rPr lang="en-US" dirty="0"/>
+                            <a:t>8294</a:t>
+                          </a:r>
+                        </a:p>
+                      </a:txBody>
+                      <a:tcPr/>
+                    </a:tc>
+                    <a:tc>
+                      <a:txBody>
+                        <a:bodyPr/>
+                        <a:lstStyle/>
+                        <a:p>
+                          <a:pPr algn="r"/>
+                          <a:r>
+                            <a:rPr lang="en-US" dirty="0"/>
+                            <a:t>50664</a:t>
+                          </a:r>
+                        </a:p>
+                      </a:txBody>
+                      <a:tcPr/>
+                    </a:tc>
+                    <a:tc>
+                      <a:txBody>
+                        <a:bodyPr/>
+                        <a:lstStyle/>
+                        <a:p>
+                          <a:pPr algn="r"/>
+                          <a:r>
+                            <a:rPr lang="en-US" dirty="0"/>
+                            <a:t>1.50</a:t>
+                          </a:r>
+                        </a:p>
+                      </a:txBody>
+                      <a:tcPr/>
+                    </a:tc>
+                    <a:tc>
+                      <a:txBody>
+                        <a:bodyPr/>
+                        <a:lstStyle/>
+                        <a:p>
+                          <a:pPr algn="r"/>
+                          <a:r>
+                            <a:rPr lang="en-US" dirty="0"/>
+                            <a:t>1</a:t>
+                          </a:r>
+                        </a:p>
+                      </a:txBody>
+                      <a:tcPr/>
+                    </a:tc>
+                    <a:extLst>
+                      <a:ext uri="{0D108BD9-81ED-4DB2-BD59-A6C34878D82A}">
+                        <a16:rowId xmlns:a16="http://schemas.microsoft.com/office/drawing/2014/main" val="1353458003"/>
+                      </a:ext>
+                    </a:extLst>
+                  </a:tr>
+                  <a:tr h="370840">
+                    <a:tc>
+                      <a:txBody>
+                        <a:bodyPr/>
+                        <a:lstStyle/>
+                        <a:p>
+                          <a:endParaRPr lang="en-US"/>
+                        </a:p>
+                      </a:txBody>
+                      <a:tcPr>
+                        <a:blipFill>
+                          <a:blip r:embed="rId2"/>
+                          <a:stretch>
+                            <a:fillRect l="-417" t="-1006557" r="-601667" b="-124590"/>
+                          </a:stretch>
+                        </a:blipFill>
+                      </a:tcPr>
+                    </a:tc>
+                    <a:tc>
+                      <a:txBody>
+                        <a:bodyPr/>
+                        <a:lstStyle/>
+                        <a:p>
+                          <a:pPr algn="r"/>
+                          <a:r>
+                            <a:rPr lang="en-US" dirty="0"/>
+                            <a:t>0.001</a:t>
+                          </a:r>
+                        </a:p>
+                      </a:txBody>
+                      <a:tcPr/>
+                    </a:tc>
+                    <a:tc>
+                      <a:txBody>
+                        <a:bodyPr/>
+                        <a:lstStyle/>
+                        <a:p>
+                          <a:pPr algn="r"/>
+                          <a:r>
+                            <a:rPr lang="en-US" dirty="0"/>
+                            <a:t>0.001</a:t>
+                          </a:r>
+                        </a:p>
+                      </a:txBody>
+                      <a:tcPr/>
+                    </a:tc>
+                    <a:tc>
+                      <a:txBody>
+                        <a:bodyPr/>
+                        <a:lstStyle/>
+                        <a:p>
+                          <a:pPr algn="r"/>
+                          <a:r>
+                            <a:rPr lang="en-US" dirty="0"/>
+                            <a:t>7701</a:t>
+                          </a:r>
+                        </a:p>
+                      </a:txBody>
+                      <a:tcPr/>
+                    </a:tc>
+                    <a:tc>
+                      <a:txBody>
+                        <a:bodyPr/>
+                        <a:lstStyle/>
+                        <a:p>
+                          <a:pPr algn="r"/>
+                          <a:r>
+                            <a:rPr lang="en-US" dirty="0"/>
+                            <a:t>43888</a:t>
+                          </a:r>
+                        </a:p>
+                      </a:txBody>
+                      <a:tcPr/>
+                    </a:tc>
+                    <a:tc>
+                      <a:txBody>
+                        <a:bodyPr/>
+                        <a:lstStyle/>
+                        <a:p>
+                          <a:pPr algn="r"/>
+                          <a:r>
+                            <a:rPr lang="en-US" dirty="0"/>
+                            <a:t>1.52</a:t>
+                          </a:r>
+                        </a:p>
+                      </a:txBody>
+                      <a:tcPr/>
+                    </a:tc>
+                    <a:tc>
+                      <a:txBody>
+                        <a:bodyPr/>
+                        <a:lstStyle/>
+                        <a:p>
+                          <a:pPr algn="r"/>
+                          <a:r>
+                            <a:rPr lang="en-US" dirty="0"/>
+                            <a:t>1</a:t>
+                          </a:r>
+                        </a:p>
+                      </a:txBody>
+                      <a:tcPr/>
+                    </a:tc>
+                    <a:extLst>
+                      <a:ext uri="{0D108BD9-81ED-4DB2-BD59-A6C34878D82A}">
+                        <a16:rowId xmlns:a16="http://schemas.microsoft.com/office/drawing/2014/main" val="2285340432"/>
+                      </a:ext>
+                    </a:extLst>
+                  </a:tr>
+                  <a:tr h="370840">
+                    <a:tc>
+                      <a:txBody>
+                        <a:bodyPr/>
+                        <a:lstStyle/>
+                        <a:p>
+                          <a:endParaRPr lang="en-US"/>
+                        </a:p>
+                      </a:txBody>
+                      <a:tcPr>
+                        <a:blipFill>
+                          <a:blip r:embed="rId2"/>
+                          <a:stretch>
+                            <a:fillRect l="-417" t="-1106557" r="-601667" b="-24590"/>
+                          </a:stretch>
+                        </a:blipFill>
+                      </a:tcPr>
+                    </a:tc>
+                    <a:tc>
+                      <a:txBody>
+                        <a:bodyPr/>
+                        <a:lstStyle/>
+                        <a:p>
+                          <a:pPr algn="r"/>
+                          <a:r>
+                            <a:rPr lang="en-US" dirty="0"/>
+                            <a:t>0.084</a:t>
+                          </a:r>
+                        </a:p>
+                      </a:txBody>
+                      <a:tcPr/>
+                    </a:tc>
+                    <a:tc>
+                      <a:txBody>
+                        <a:bodyPr/>
+                        <a:lstStyle/>
+                        <a:p>
+                          <a:pPr algn="r"/>
+                          <a:r>
+                            <a:rPr lang="en-US" dirty="0"/>
+                            <a:t>0.084</a:t>
+                          </a:r>
+                        </a:p>
+                      </a:txBody>
+                      <a:tcPr/>
+                    </a:tc>
+                    <a:tc>
+                      <a:txBody>
+                        <a:bodyPr/>
+                        <a:lstStyle/>
+                        <a:p>
+                          <a:pPr algn="r"/>
+                          <a:r>
+                            <a:rPr lang="en-US" dirty="0"/>
+                            <a:t>9000</a:t>
+                          </a:r>
+                        </a:p>
+                      </a:txBody>
+                      <a:tcPr/>
+                    </a:tc>
+                    <a:tc>
+                      <a:txBody>
+                        <a:bodyPr/>
+                        <a:lstStyle/>
+                        <a:p>
+                          <a:pPr algn="r"/>
+                          <a:r>
+                            <a:rPr lang="en-US" dirty="0"/>
+                            <a:t>65405</a:t>
+                          </a:r>
+                        </a:p>
+                      </a:txBody>
+                      <a:tcPr/>
+                    </a:tc>
+                    <a:tc>
+                      <a:txBody>
+                        <a:bodyPr/>
+                        <a:lstStyle/>
+                        <a:p>
+                          <a:pPr algn="r"/>
+                          <a:r>
+                            <a:rPr lang="en-US" dirty="0"/>
+                            <a:t>1.52</a:t>
+                          </a:r>
+                        </a:p>
+                      </a:txBody>
+                      <a:tcPr/>
+                    </a:tc>
+                    <a:tc>
+                      <a:txBody>
+                        <a:bodyPr/>
+                        <a:lstStyle/>
+                        <a:p>
+                          <a:pPr algn="r"/>
+                          <a:r>
+                            <a:rPr lang="en-US" dirty="0"/>
+                            <a:t>1</a:t>
+                          </a:r>
+                        </a:p>
+                      </a:txBody>
+                      <a:tcPr/>
+                    </a:tc>
+                    <a:extLst>
+                      <a:ext uri="{0D108BD9-81ED-4DB2-BD59-A6C34878D82A}">
+                        <a16:rowId xmlns:a16="http://schemas.microsoft.com/office/drawing/2014/main" val="508397299"/>
+                      </a:ext>
+                    </a:extLst>
+                  </a:tr>
+                </a:tbl>
+              </a:graphicData>
+            </a:graphic>
+          </p:graphicFrame>
+        </mc:Fallback>
+      </mc:AlternateContent>
     </p:spTree>
     <p:extLst>
       <p:ext uri="{BB962C8B-B14F-4D97-AF65-F5344CB8AC3E}">

</xml_diff>